<commit_message>
make happy engineer part2 and part3
</commit_message>
<xml_diff>
--- a/HappyEngineer_part2.pptx
+++ b/HappyEngineer_part2.pptx
@@ -5,16 +5,20 @@
     <p:sldMasterId id="2147483708" r:id="rId1"/>
   </p:sldMasterIdLst>
   <p:notesMasterIdLst>
-    <p:notesMasterId r:id="rId9"/>
+    <p:notesMasterId r:id="rId13"/>
   </p:notesMasterIdLst>
   <p:sldIdLst>
     <p:sldId id="256" r:id="rId2"/>
     <p:sldId id="270" r:id="rId3"/>
     <p:sldId id="272" r:id="rId4"/>
     <p:sldId id="257" r:id="rId5"/>
-    <p:sldId id="271" r:id="rId6"/>
-    <p:sldId id="268" r:id="rId7"/>
-    <p:sldId id="269" r:id="rId8"/>
+    <p:sldId id="273" r:id="rId6"/>
+    <p:sldId id="274" r:id="rId7"/>
+    <p:sldId id="275" r:id="rId8"/>
+    <p:sldId id="276" r:id="rId9"/>
+    <p:sldId id="277" r:id="rId10"/>
+    <p:sldId id="268" r:id="rId11"/>
+    <p:sldId id="271" r:id="rId12"/>
   </p:sldIdLst>
   <p:sldSz cx="12192000" cy="6858000"/>
   <p:notesSz cx="6858000" cy="9144000"/>
@@ -1604,7 +1608,7 @@
           </a:lstStyle>
           <a:p>
             <a:r>
-              <a:rPr lang="ja-JP" altLang="en-US" smtClean="0"/>
+              <a:rPr lang="ja-JP" altLang="en-US"/>
               <a:t>マスター タイトルの書式設定</a:t>
             </a:r>
             <a:endParaRPr lang="en-US" dirty="0"/>
@@ -1678,7 +1682,7 @@
           </a:lstStyle>
           <a:p>
             <a:r>
-              <a:rPr lang="ja-JP" altLang="en-US" smtClean="0"/>
+              <a:rPr lang="ja-JP" altLang="en-US"/>
               <a:t>マスター サブタイトルの書式設定</a:t>
             </a:r>
             <a:endParaRPr lang="en-US" dirty="0"/>
@@ -1843,7 +1847,7 @@
 
 <file path=ppt/slideLayouts/slideLayout10.xml><?xml version="1.0" encoding="utf-8"?>
 <p:sldLayout xmlns:a="http://schemas.openxmlformats.org/drawingml/2006/main" xmlns:r="http://schemas.openxmlformats.org/officeDocument/2006/relationships" xmlns:p="http://schemas.openxmlformats.org/presentationml/2006/main" type="vertTx" preserve="1">
-  <p:cSld name="タイトルと&#13;&#10;縦書きテキスト">
+  <p:cSld name="タイトルと&#10;縦書きテキスト">
     <p:spTree>
       <p:nvGrpSpPr>
         <p:cNvPr id="1" name=""/>
@@ -1874,7 +1878,7 @@
           <a:lstStyle/>
           <a:p>
             <a:r>
-              <a:rPr lang="ja-JP" altLang="en-US" smtClean="0"/>
+              <a:rPr lang="ja-JP" altLang="en-US"/>
               <a:t>マスター タイトルの書式設定</a:t>
             </a:r>
             <a:endParaRPr lang="en-US" dirty="0"/>
@@ -1898,67 +1902,67 @@
           <a:p>
             <a:pPr lvl="0"/>
             <a:r>
-              <a:rPr lang="ja-JP" altLang="en-US" smtClean="0"/>
+              <a:rPr lang="ja-JP" altLang="en-US"/>
               <a:t>マスター テキストの書式設定</a:t>
             </a:r>
           </a:p>
           <a:p>
             <a:pPr lvl="1"/>
             <a:r>
-              <a:rPr lang="ja-JP" altLang="en-US" smtClean="0"/>
+              <a:rPr lang="ja-JP" altLang="en-US"/>
               <a:t>第 </a:t>
             </a:r>
             <a:r>
-              <a:rPr lang="en-US" altLang="ja-JP" smtClean="0"/>
+              <a:rPr lang="en-US" altLang="ja-JP"/>
               <a:t>2 </a:t>
             </a:r>
             <a:r>
-              <a:rPr lang="ja-JP" altLang="en-US" smtClean="0"/>
+              <a:rPr lang="ja-JP" altLang="en-US"/>
               <a:t>レベル</a:t>
             </a:r>
           </a:p>
           <a:p>
             <a:pPr lvl="2"/>
             <a:r>
-              <a:rPr lang="ja-JP" altLang="en-US" smtClean="0"/>
+              <a:rPr lang="ja-JP" altLang="en-US"/>
               <a:t>第 </a:t>
             </a:r>
             <a:r>
-              <a:rPr lang="en-US" altLang="ja-JP" smtClean="0"/>
+              <a:rPr lang="en-US" altLang="ja-JP"/>
               <a:t>3 </a:t>
             </a:r>
             <a:r>
-              <a:rPr lang="ja-JP" altLang="en-US" smtClean="0"/>
+              <a:rPr lang="ja-JP" altLang="en-US"/>
               <a:t>レベル</a:t>
             </a:r>
           </a:p>
           <a:p>
             <a:pPr lvl="3"/>
             <a:r>
-              <a:rPr lang="ja-JP" altLang="en-US" smtClean="0"/>
+              <a:rPr lang="ja-JP" altLang="en-US"/>
               <a:t>第 </a:t>
             </a:r>
             <a:r>
-              <a:rPr lang="en-US" altLang="ja-JP" smtClean="0"/>
+              <a:rPr lang="en-US" altLang="ja-JP"/>
               <a:t>4 </a:t>
             </a:r>
             <a:r>
-              <a:rPr lang="ja-JP" altLang="en-US" smtClean="0"/>
+              <a:rPr lang="ja-JP" altLang="en-US"/>
               <a:t>レベル</a:t>
             </a:r>
           </a:p>
           <a:p>
             <a:pPr lvl="4"/>
             <a:r>
-              <a:rPr lang="ja-JP" altLang="en-US" smtClean="0"/>
+              <a:rPr lang="ja-JP" altLang="en-US"/>
               <a:t>第 </a:t>
             </a:r>
             <a:r>
-              <a:rPr lang="en-US" altLang="ja-JP" smtClean="0"/>
+              <a:rPr lang="en-US" altLang="ja-JP"/>
               <a:t>5 </a:t>
             </a:r>
             <a:r>
-              <a:rPr lang="ja-JP" altLang="en-US" smtClean="0"/>
+              <a:rPr lang="ja-JP" altLang="en-US"/>
               <a:t>レベル</a:t>
             </a:r>
             <a:endParaRPr lang="en-US" dirty="0"/>
@@ -2076,7 +2080,7 @@
           <a:lstStyle/>
           <a:p>
             <a:r>
-              <a:rPr lang="ja-JP" altLang="en-US" smtClean="0"/>
+              <a:rPr lang="ja-JP" altLang="en-US"/>
               <a:t>マスター タイトルの書式設定</a:t>
             </a:r>
             <a:endParaRPr lang="en-US" dirty="0"/>
@@ -2105,67 +2109,67 @@
           <a:p>
             <a:pPr lvl="0"/>
             <a:r>
-              <a:rPr lang="ja-JP" altLang="en-US" smtClean="0"/>
+              <a:rPr lang="ja-JP" altLang="en-US"/>
               <a:t>マスター テキストの書式設定</a:t>
             </a:r>
           </a:p>
           <a:p>
             <a:pPr lvl="1"/>
             <a:r>
-              <a:rPr lang="ja-JP" altLang="en-US" smtClean="0"/>
+              <a:rPr lang="ja-JP" altLang="en-US"/>
               <a:t>第 </a:t>
             </a:r>
             <a:r>
-              <a:rPr lang="en-US" altLang="ja-JP" smtClean="0"/>
+              <a:rPr lang="en-US" altLang="ja-JP"/>
               <a:t>2 </a:t>
             </a:r>
             <a:r>
-              <a:rPr lang="ja-JP" altLang="en-US" smtClean="0"/>
+              <a:rPr lang="ja-JP" altLang="en-US"/>
               <a:t>レベル</a:t>
             </a:r>
           </a:p>
           <a:p>
             <a:pPr lvl="2"/>
             <a:r>
-              <a:rPr lang="ja-JP" altLang="en-US" smtClean="0"/>
+              <a:rPr lang="ja-JP" altLang="en-US"/>
               <a:t>第 </a:t>
             </a:r>
             <a:r>
-              <a:rPr lang="en-US" altLang="ja-JP" smtClean="0"/>
+              <a:rPr lang="en-US" altLang="ja-JP"/>
               <a:t>3 </a:t>
             </a:r>
             <a:r>
-              <a:rPr lang="ja-JP" altLang="en-US" smtClean="0"/>
+              <a:rPr lang="ja-JP" altLang="en-US"/>
               <a:t>レベル</a:t>
             </a:r>
           </a:p>
           <a:p>
             <a:pPr lvl="3"/>
             <a:r>
-              <a:rPr lang="ja-JP" altLang="en-US" smtClean="0"/>
+              <a:rPr lang="ja-JP" altLang="en-US"/>
               <a:t>第 </a:t>
             </a:r>
             <a:r>
-              <a:rPr lang="en-US" altLang="ja-JP" smtClean="0"/>
+              <a:rPr lang="en-US" altLang="ja-JP"/>
               <a:t>4 </a:t>
             </a:r>
             <a:r>
-              <a:rPr lang="ja-JP" altLang="en-US" smtClean="0"/>
+              <a:rPr lang="ja-JP" altLang="en-US"/>
               <a:t>レベル</a:t>
             </a:r>
           </a:p>
           <a:p>
             <a:pPr lvl="4"/>
             <a:r>
-              <a:rPr lang="ja-JP" altLang="en-US" smtClean="0"/>
+              <a:rPr lang="ja-JP" altLang="en-US"/>
               <a:t>第 </a:t>
             </a:r>
             <a:r>
-              <a:rPr lang="en-US" altLang="ja-JP" smtClean="0"/>
+              <a:rPr lang="en-US" altLang="ja-JP"/>
               <a:t>5 </a:t>
             </a:r>
             <a:r>
-              <a:rPr lang="ja-JP" altLang="en-US" smtClean="0"/>
+              <a:rPr lang="ja-JP" altLang="en-US"/>
               <a:t>レベル</a:t>
             </a:r>
             <a:endParaRPr lang="en-US" dirty="0"/>
@@ -2278,7 +2282,7 @@
           <a:lstStyle/>
           <a:p>
             <a:r>
-              <a:rPr lang="ja-JP" altLang="en-US" smtClean="0"/>
+              <a:rPr lang="ja-JP" altLang="en-US"/>
               <a:t>マスター タイトルの書式設定</a:t>
             </a:r>
             <a:endParaRPr lang="en-US" dirty="0"/>
@@ -2302,67 +2306,67 @@
           <a:p>
             <a:pPr lvl="0"/>
             <a:r>
-              <a:rPr lang="ja-JP" altLang="en-US" smtClean="0"/>
+              <a:rPr lang="ja-JP" altLang="en-US"/>
               <a:t>マスター テキストの書式設定</a:t>
             </a:r>
           </a:p>
           <a:p>
             <a:pPr lvl="1"/>
             <a:r>
-              <a:rPr lang="ja-JP" altLang="en-US" smtClean="0"/>
+              <a:rPr lang="ja-JP" altLang="en-US"/>
               <a:t>第 </a:t>
             </a:r>
             <a:r>
-              <a:rPr lang="en-US" altLang="ja-JP" smtClean="0"/>
+              <a:rPr lang="en-US" altLang="ja-JP"/>
               <a:t>2 </a:t>
             </a:r>
             <a:r>
-              <a:rPr lang="ja-JP" altLang="en-US" smtClean="0"/>
+              <a:rPr lang="ja-JP" altLang="en-US"/>
               <a:t>レベル</a:t>
             </a:r>
           </a:p>
           <a:p>
             <a:pPr lvl="2"/>
             <a:r>
-              <a:rPr lang="ja-JP" altLang="en-US" smtClean="0"/>
+              <a:rPr lang="ja-JP" altLang="en-US"/>
               <a:t>第 </a:t>
             </a:r>
             <a:r>
-              <a:rPr lang="en-US" altLang="ja-JP" smtClean="0"/>
+              <a:rPr lang="en-US" altLang="ja-JP"/>
               <a:t>3 </a:t>
             </a:r>
             <a:r>
-              <a:rPr lang="ja-JP" altLang="en-US" smtClean="0"/>
+              <a:rPr lang="ja-JP" altLang="en-US"/>
               <a:t>レベル</a:t>
             </a:r>
           </a:p>
           <a:p>
             <a:pPr lvl="3"/>
             <a:r>
-              <a:rPr lang="ja-JP" altLang="en-US" smtClean="0"/>
+              <a:rPr lang="ja-JP" altLang="en-US"/>
               <a:t>第 </a:t>
             </a:r>
             <a:r>
-              <a:rPr lang="en-US" altLang="ja-JP" smtClean="0"/>
+              <a:rPr lang="en-US" altLang="ja-JP"/>
               <a:t>4 </a:t>
             </a:r>
             <a:r>
-              <a:rPr lang="ja-JP" altLang="en-US" smtClean="0"/>
+              <a:rPr lang="ja-JP" altLang="en-US"/>
               <a:t>レベル</a:t>
             </a:r>
           </a:p>
           <a:p>
             <a:pPr lvl="4"/>
             <a:r>
-              <a:rPr lang="ja-JP" altLang="en-US" smtClean="0"/>
+              <a:rPr lang="ja-JP" altLang="en-US"/>
               <a:t>第 </a:t>
             </a:r>
             <a:r>
-              <a:rPr lang="en-US" altLang="ja-JP" smtClean="0"/>
+              <a:rPr lang="en-US" altLang="ja-JP"/>
               <a:t>5 </a:t>
             </a:r>
             <a:r>
-              <a:rPr lang="ja-JP" altLang="en-US" smtClean="0"/>
+              <a:rPr lang="ja-JP" altLang="en-US"/>
               <a:t>レベル</a:t>
             </a:r>
             <a:endParaRPr lang="en-US" dirty="0"/>
@@ -2498,7 +2502,7 @@
           </a:lstStyle>
           <a:p>
             <a:r>
-              <a:rPr lang="ja-JP" altLang="en-US" smtClean="0"/>
+              <a:rPr lang="ja-JP" altLang="en-US"/>
               <a:t>マスター タイトルの書式設定</a:t>
             </a:r>
             <a:endParaRPr lang="en-US" dirty="0"/>
@@ -2621,7 +2625,7 @@
           <a:p>
             <a:pPr lvl="0"/>
             <a:r>
-              <a:rPr lang="ja-JP" altLang="en-US" smtClean="0"/>
+              <a:rPr lang="ja-JP" altLang="en-US"/>
               <a:t>マスター テキストの書式設定</a:t>
             </a:r>
           </a:p>
@@ -3715,7 +3719,7 @@
           <a:lstStyle/>
           <a:p>
             <a:r>
-              <a:rPr lang="ja-JP" altLang="en-US" smtClean="0"/>
+              <a:rPr lang="ja-JP" altLang="en-US"/>
               <a:t>マスター タイトルの書式設定</a:t>
             </a:r>
             <a:endParaRPr lang="en-US" dirty="0"/>
@@ -3744,67 +3748,67 @@
           <a:p>
             <a:pPr lvl="0"/>
             <a:r>
-              <a:rPr lang="ja-JP" altLang="en-US" smtClean="0"/>
+              <a:rPr lang="ja-JP" altLang="en-US"/>
               <a:t>マスター テキストの書式設定</a:t>
             </a:r>
           </a:p>
           <a:p>
             <a:pPr lvl="1"/>
             <a:r>
-              <a:rPr lang="ja-JP" altLang="en-US" smtClean="0"/>
+              <a:rPr lang="ja-JP" altLang="en-US"/>
               <a:t>第 </a:t>
             </a:r>
             <a:r>
-              <a:rPr lang="en-US" altLang="ja-JP" smtClean="0"/>
+              <a:rPr lang="en-US" altLang="ja-JP"/>
               <a:t>2 </a:t>
             </a:r>
             <a:r>
-              <a:rPr lang="ja-JP" altLang="en-US" smtClean="0"/>
+              <a:rPr lang="ja-JP" altLang="en-US"/>
               <a:t>レベル</a:t>
             </a:r>
           </a:p>
           <a:p>
             <a:pPr lvl="2"/>
             <a:r>
-              <a:rPr lang="ja-JP" altLang="en-US" smtClean="0"/>
+              <a:rPr lang="ja-JP" altLang="en-US"/>
               <a:t>第 </a:t>
             </a:r>
             <a:r>
-              <a:rPr lang="en-US" altLang="ja-JP" smtClean="0"/>
+              <a:rPr lang="en-US" altLang="ja-JP"/>
               <a:t>3 </a:t>
             </a:r>
             <a:r>
-              <a:rPr lang="ja-JP" altLang="en-US" smtClean="0"/>
+              <a:rPr lang="ja-JP" altLang="en-US"/>
               <a:t>レベル</a:t>
             </a:r>
           </a:p>
           <a:p>
             <a:pPr lvl="3"/>
             <a:r>
-              <a:rPr lang="ja-JP" altLang="en-US" smtClean="0"/>
+              <a:rPr lang="ja-JP" altLang="en-US"/>
               <a:t>第 </a:t>
             </a:r>
             <a:r>
-              <a:rPr lang="en-US" altLang="ja-JP" smtClean="0"/>
+              <a:rPr lang="en-US" altLang="ja-JP"/>
               <a:t>4 </a:t>
             </a:r>
             <a:r>
-              <a:rPr lang="ja-JP" altLang="en-US" smtClean="0"/>
+              <a:rPr lang="ja-JP" altLang="en-US"/>
               <a:t>レベル</a:t>
             </a:r>
           </a:p>
           <a:p>
             <a:pPr lvl="4"/>
             <a:r>
-              <a:rPr lang="ja-JP" altLang="en-US" smtClean="0"/>
+              <a:rPr lang="ja-JP" altLang="en-US"/>
               <a:t>第 </a:t>
             </a:r>
             <a:r>
-              <a:rPr lang="en-US" altLang="ja-JP" smtClean="0"/>
+              <a:rPr lang="en-US" altLang="ja-JP"/>
               <a:t>5 </a:t>
             </a:r>
             <a:r>
-              <a:rPr lang="ja-JP" altLang="en-US" smtClean="0"/>
+              <a:rPr lang="ja-JP" altLang="en-US"/>
               <a:t>レベル</a:t>
             </a:r>
             <a:endParaRPr lang="en-US" dirty="0"/>
@@ -3833,67 +3837,67 @@
           <a:p>
             <a:pPr lvl="0"/>
             <a:r>
-              <a:rPr lang="ja-JP" altLang="en-US" smtClean="0"/>
+              <a:rPr lang="ja-JP" altLang="en-US"/>
               <a:t>マスター テキストの書式設定</a:t>
             </a:r>
           </a:p>
           <a:p>
             <a:pPr lvl="1"/>
             <a:r>
-              <a:rPr lang="ja-JP" altLang="en-US" smtClean="0"/>
+              <a:rPr lang="ja-JP" altLang="en-US"/>
               <a:t>第 </a:t>
             </a:r>
             <a:r>
-              <a:rPr lang="en-US" altLang="ja-JP" smtClean="0"/>
+              <a:rPr lang="en-US" altLang="ja-JP"/>
               <a:t>2 </a:t>
             </a:r>
             <a:r>
-              <a:rPr lang="ja-JP" altLang="en-US" smtClean="0"/>
+              <a:rPr lang="ja-JP" altLang="en-US"/>
               <a:t>レベル</a:t>
             </a:r>
           </a:p>
           <a:p>
             <a:pPr lvl="2"/>
             <a:r>
-              <a:rPr lang="ja-JP" altLang="en-US" smtClean="0"/>
+              <a:rPr lang="ja-JP" altLang="en-US"/>
               <a:t>第 </a:t>
             </a:r>
             <a:r>
-              <a:rPr lang="en-US" altLang="ja-JP" smtClean="0"/>
+              <a:rPr lang="en-US" altLang="ja-JP"/>
               <a:t>3 </a:t>
             </a:r>
             <a:r>
-              <a:rPr lang="ja-JP" altLang="en-US" smtClean="0"/>
+              <a:rPr lang="ja-JP" altLang="en-US"/>
               <a:t>レベル</a:t>
             </a:r>
           </a:p>
           <a:p>
             <a:pPr lvl="3"/>
             <a:r>
-              <a:rPr lang="ja-JP" altLang="en-US" smtClean="0"/>
+              <a:rPr lang="ja-JP" altLang="en-US"/>
               <a:t>第 </a:t>
             </a:r>
             <a:r>
-              <a:rPr lang="en-US" altLang="ja-JP" smtClean="0"/>
+              <a:rPr lang="en-US" altLang="ja-JP"/>
               <a:t>4 </a:t>
             </a:r>
             <a:r>
-              <a:rPr lang="ja-JP" altLang="en-US" smtClean="0"/>
+              <a:rPr lang="ja-JP" altLang="en-US"/>
               <a:t>レベル</a:t>
             </a:r>
           </a:p>
           <a:p>
             <a:pPr lvl="4"/>
             <a:r>
-              <a:rPr lang="ja-JP" altLang="en-US" smtClean="0"/>
+              <a:rPr lang="ja-JP" altLang="en-US"/>
               <a:t>第 </a:t>
             </a:r>
             <a:r>
-              <a:rPr lang="en-US" altLang="ja-JP" smtClean="0"/>
+              <a:rPr lang="en-US" altLang="ja-JP"/>
               <a:t>5 </a:t>
             </a:r>
             <a:r>
-              <a:rPr lang="ja-JP" altLang="en-US" smtClean="0"/>
+              <a:rPr lang="ja-JP" altLang="en-US"/>
               <a:t>レベル</a:t>
             </a:r>
             <a:endParaRPr lang="en-US" dirty="0"/>
@@ -4016,7 +4020,7 @@
           <a:lstStyle/>
           <a:p>
             <a:r>
-              <a:rPr lang="ja-JP" altLang="en-US" smtClean="0"/>
+              <a:rPr lang="ja-JP" altLang="en-US"/>
               <a:t>マスター タイトルの書式設定</a:t>
             </a:r>
             <a:endParaRPr lang="en-US" dirty="0"/>
@@ -4091,7 +4095,7 @@
           <a:p>
             <a:pPr lvl="0"/>
             <a:r>
-              <a:rPr lang="ja-JP" altLang="en-US" smtClean="0"/>
+              <a:rPr lang="ja-JP" altLang="en-US"/>
               <a:t>マスター テキストの書式設定</a:t>
             </a:r>
           </a:p>
@@ -4119,67 +4123,67 @@
           <a:p>
             <a:pPr lvl="0"/>
             <a:r>
-              <a:rPr lang="ja-JP" altLang="en-US" smtClean="0"/>
+              <a:rPr lang="ja-JP" altLang="en-US"/>
               <a:t>マスター テキストの書式設定</a:t>
             </a:r>
           </a:p>
           <a:p>
             <a:pPr lvl="1"/>
             <a:r>
-              <a:rPr lang="ja-JP" altLang="en-US" smtClean="0"/>
+              <a:rPr lang="ja-JP" altLang="en-US"/>
               <a:t>第 </a:t>
             </a:r>
             <a:r>
-              <a:rPr lang="en-US" altLang="ja-JP" smtClean="0"/>
+              <a:rPr lang="en-US" altLang="ja-JP"/>
               <a:t>2 </a:t>
             </a:r>
             <a:r>
-              <a:rPr lang="ja-JP" altLang="en-US" smtClean="0"/>
+              <a:rPr lang="ja-JP" altLang="en-US"/>
               <a:t>レベル</a:t>
             </a:r>
           </a:p>
           <a:p>
             <a:pPr lvl="2"/>
             <a:r>
-              <a:rPr lang="ja-JP" altLang="en-US" smtClean="0"/>
+              <a:rPr lang="ja-JP" altLang="en-US"/>
               <a:t>第 </a:t>
             </a:r>
             <a:r>
-              <a:rPr lang="en-US" altLang="ja-JP" smtClean="0"/>
+              <a:rPr lang="en-US" altLang="ja-JP"/>
               <a:t>3 </a:t>
             </a:r>
             <a:r>
-              <a:rPr lang="ja-JP" altLang="en-US" smtClean="0"/>
+              <a:rPr lang="ja-JP" altLang="en-US"/>
               <a:t>レベル</a:t>
             </a:r>
           </a:p>
           <a:p>
             <a:pPr lvl="3"/>
             <a:r>
-              <a:rPr lang="ja-JP" altLang="en-US" smtClean="0"/>
+              <a:rPr lang="ja-JP" altLang="en-US"/>
               <a:t>第 </a:t>
             </a:r>
             <a:r>
-              <a:rPr lang="en-US" altLang="ja-JP" smtClean="0"/>
+              <a:rPr lang="en-US" altLang="ja-JP"/>
               <a:t>4 </a:t>
             </a:r>
             <a:r>
-              <a:rPr lang="ja-JP" altLang="en-US" smtClean="0"/>
+              <a:rPr lang="ja-JP" altLang="en-US"/>
               <a:t>レベル</a:t>
             </a:r>
           </a:p>
           <a:p>
             <a:pPr lvl="4"/>
             <a:r>
-              <a:rPr lang="ja-JP" altLang="en-US" smtClean="0"/>
+              <a:rPr lang="ja-JP" altLang="en-US"/>
               <a:t>第 </a:t>
             </a:r>
             <a:r>
-              <a:rPr lang="en-US" altLang="ja-JP" smtClean="0"/>
+              <a:rPr lang="en-US" altLang="ja-JP"/>
               <a:t>5 </a:t>
             </a:r>
             <a:r>
-              <a:rPr lang="ja-JP" altLang="en-US" smtClean="0"/>
+              <a:rPr lang="ja-JP" altLang="en-US"/>
               <a:t>レベル</a:t>
             </a:r>
             <a:endParaRPr lang="en-US" dirty="0"/>
@@ -4254,7 +4258,7 @@
           <a:p>
             <a:pPr lvl="0"/>
             <a:r>
-              <a:rPr lang="ja-JP" altLang="en-US" smtClean="0"/>
+              <a:rPr lang="ja-JP" altLang="en-US"/>
               <a:t>マスター テキストの書式設定</a:t>
             </a:r>
           </a:p>
@@ -4282,67 +4286,67 @@
           <a:p>
             <a:pPr lvl="0"/>
             <a:r>
-              <a:rPr lang="ja-JP" altLang="en-US" smtClean="0"/>
+              <a:rPr lang="ja-JP" altLang="en-US"/>
               <a:t>マスター テキストの書式設定</a:t>
             </a:r>
           </a:p>
           <a:p>
             <a:pPr lvl="1"/>
             <a:r>
-              <a:rPr lang="ja-JP" altLang="en-US" smtClean="0"/>
+              <a:rPr lang="ja-JP" altLang="en-US"/>
               <a:t>第 </a:t>
             </a:r>
             <a:r>
-              <a:rPr lang="en-US" altLang="ja-JP" smtClean="0"/>
+              <a:rPr lang="en-US" altLang="ja-JP"/>
               <a:t>2 </a:t>
             </a:r>
             <a:r>
-              <a:rPr lang="ja-JP" altLang="en-US" smtClean="0"/>
+              <a:rPr lang="ja-JP" altLang="en-US"/>
               <a:t>レベル</a:t>
             </a:r>
           </a:p>
           <a:p>
             <a:pPr lvl="2"/>
             <a:r>
-              <a:rPr lang="ja-JP" altLang="en-US" smtClean="0"/>
+              <a:rPr lang="ja-JP" altLang="en-US"/>
               <a:t>第 </a:t>
             </a:r>
             <a:r>
-              <a:rPr lang="en-US" altLang="ja-JP" smtClean="0"/>
+              <a:rPr lang="en-US" altLang="ja-JP"/>
               <a:t>3 </a:t>
             </a:r>
             <a:r>
-              <a:rPr lang="ja-JP" altLang="en-US" smtClean="0"/>
+              <a:rPr lang="ja-JP" altLang="en-US"/>
               <a:t>レベル</a:t>
             </a:r>
           </a:p>
           <a:p>
             <a:pPr lvl="3"/>
             <a:r>
-              <a:rPr lang="ja-JP" altLang="en-US" smtClean="0"/>
+              <a:rPr lang="ja-JP" altLang="en-US"/>
               <a:t>第 </a:t>
             </a:r>
             <a:r>
-              <a:rPr lang="en-US" altLang="ja-JP" smtClean="0"/>
+              <a:rPr lang="en-US" altLang="ja-JP"/>
               <a:t>4 </a:t>
             </a:r>
             <a:r>
-              <a:rPr lang="ja-JP" altLang="en-US" smtClean="0"/>
+              <a:rPr lang="ja-JP" altLang="en-US"/>
               <a:t>レベル</a:t>
             </a:r>
           </a:p>
           <a:p>
             <a:pPr lvl="4"/>
             <a:r>
-              <a:rPr lang="ja-JP" altLang="en-US" smtClean="0"/>
+              <a:rPr lang="ja-JP" altLang="en-US"/>
               <a:t>第 </a:t>
             </a:r>
             <a:r>
-              <a:rPr lang="en-US" altLang="ja-JP" smtClean="0"/>
+              <a:rPr lang="en-US" altLang="ja-JP"/>
               <a:t>5 </a:t>
             </a:r>
             <a:r>
-              <a:rPr lang="ja-JP" altLang="en-US" smtClean="0"/>
+              <a:rPr lang="ja-JP" altLang="en-US"/>
               <a:t>レベル</a:t>
             </a:r>
             <a:endParaRPr lang="en-US" dirty="0"/>
@@ -4460,7 +4464,7 @@
           <a:lstStyle/>
           <a:p>
             <a:r>
-              <a:rPr lang="ja-JP" altLang="en-US" smtClean="0"/>
+              <a:rPr lang="ja-JP" altLang="en-US"/>
               <a:t>マスター タイトルの書式設定</a:t>
             </a:r>
             <a:endParaRPr lang="en-US" dirty="0"/>
@@ -4632,7 +4636,7 @@
 
 <file path=ppt/slideLayouts/slideLayout8.xml><?xml version="1.0" encoding="utf-8"?>
 <p:sldLayout xmlns:a="http://schemas.openxmlformats.org/drawingml/2006/main" xmlns:r="http://schemas.openxmlformats.org/officeDocument/2006/relationships" xmlns:p="http://schemas.openxmlformats.org/presentationml/2006/main" showMasterSp="0" type="objTx" preserve="1">
-  <p:cSld name="タイトル付きの&#13;&#10;コンテンツ">
+  <p:cSld name="タイトル付きの&#10;コンテンツ">
     <p:spTree>
       <p:nvGrpSpPr>
         <p:cNvPr id="1" name=""/>
@@ -5143,7 +5147,7 @@
           </a:lstStyle>
           <a:p>
             <a:r>
-              <a:rPr lang="ja-JP" altLang="en-US" smtClean="0"/>
+              <a:rPr lang="ja-JP" altLang="en-US"/>
               <a:t>マスター タイトルの書式設定</a:t>
             </a:r>
             <a:endParaRPr lang="en-US" dirty="0"/>
@@ -5200,67 +5204,67 @@
           <a:p>
             <a:pPr lvl="0"/>
             <a:r>
-              <a:rPr lang="ja-JP" altLang="en-US" smtClean="0"/>
+              <a:rPr lang="ja-JP" altLang="en-US"/>
               <a:t>マスター テキストの書式設定</a:t>
             </a:r>
           </a:p>
           <a:p>
             <a:pPr lvl="1"/>
             <a:r>
-              <a:rPr lang="ja-JP" altLang="en-US" smtClean="0"/>
+              <a:rPr lang="ja-JP" altLang="en-US"/>
               <a:t>第 </a:t>
             </a:r>
             <a:r>
-              <a:rPr lang="en-US" altLang="ja-JP" smtClean="0"/>
+              <a:rPr lang="en-US" altLang="ja-JP"/>
               <a:t>2 </a:t>
             </a:r>
             <a:r>
-              <a:rPr lang="ja-JP" altLang="en-US" smtClean="0"/>
+              <a:rPr lang="ja-JP" altLang="en-US"/>
               <a:t>レベル</a:t>
             </a:r>
           </a:p>
           <a:p>
             <a:pPr lvl="2"/>
             <a:r>
-              <a:rPr lang="ja-JP" altLang="en-US" smtClean="0"/>
+              <a:rPr lang="ja-JP" altLang="en-US"/>
               <a:t>第 </a:t>
             </a:r>
             <a:r>
-              <a:rPr lang="en-US" altLang="ja-JP" smtClean="0"/>
+              <a:rPr lang="en-US" altLang="ja-JP"/>
               <a:t>3 </a:t>
             </a:r>
             <a:r>
-              <a:rPr lang="ja-JP" altLang="en-US" smtClean="0"/>
+              <a:rPr lang="ja-JP" altLang="en-US"/>
               <a:t>レベル</a:t>
             </a:r>
           </a:p>
           <a:p>
             <a:pPr lvl="3"/>
             <a:r>
-              <a:rPr lang="ja-JP" altLang="en-US" smtClean="0"/>
+              <a:rPr lang="ja-JP" altLang="en-US"/>
               <a:t>第 </a:t>
             </a:r>
             <a:r>
-              <a:rPr lang="en-US" altLang="ja-JP" smtClean="0"/>
+              <a:rPr lang="en-US" altLang="ja-JP"/>
               <a:t>4 </a:t>
             </a:r>
             <a:r>
-              <a:rPr lang="ja-JP" altLang="en-US" smtClean="0"/>
+              <a:rPr lang="ja-JP" altLang="en-US"/>
               <a:t>レベル</a:t>
             </a:r>
           </a:p>
           <a:p>
             <a:pPr lvl="4"/>
             <a:r>
-              <a:rPr lang="ja-JP" altLang="en-US" smtClean="0"/>
+              <a:rPr lang="ja-JP" altLang="en-US"/>
               <a:t>第 </a:t>
             </a:r>
             <a:r>
-              <a:rPr lang="en-US" altLang="ja-JP" smtClean="0"/>
+              <a:rPr lang="en-US" altLang="ja-JP"/>
               <a:t>5 </a:t>
             </a:r>
             <a:r>
-              <a:rPr lang="ja-JP" altLang="en-US" smtClean="0"/>
+              <a:rPr lang="ja-JP" altLang="en-US"/>
               <a:t>レベル</a:t>
             </a:r>
             <a:endParaRPr lang="en-US" dirty="0"/>
@@ -5336,7 +5340,7 @@
           <a:p>
             <a:pPr lvl="0"/>
             <a:r>
-              <a:rPr lang="ja-JP" altLang="en-US" smtClean="0"/>
+              <a:rPr lang="ja-JP" altLang="en-US"/>
               <a:t>マスター テキストの書式設定</a:t>
             </a:r>
           </a:p>
@@ -5554,7 +5558,7 @@
           </a:lstStyle>
           <a:p>
             <a:r>
-              <a:rPr lang="ja-JP" altLang="en-US" smtClean="0"/>
+              <a:rPr lang="ja-JP" altLang="en-US"/>
               <a:t>プレースホルダーまでドラッグするかアイコンをクリックして図を追加</a:t>
             </a:r>
             <a:endParaRPr lang="en-US" dirty="0"/>
@@ -6095,7 +6099,7 @@
           </a:lstStyle>
           <a:p>
             <a:r>
-              <a:rPr lang="ja-JP" altLang="en-US" smtClean="0"/>
+              <a:rPr lang="ja-JP" altLang="en-US"/>
               <a:t>マスター タイトルの書式設定</a:t>
             </a:r>
             <a:endParaRPr lang="en-US" dirty="0"/>
@@ -6171,7 +6175,7 @@
           <a:p>
             <a:pPr lvl="0"/>
             <a:r>
-              <a:rPr lang="ja-JP" altLang="en-US" smtClean="0"/>
+              <a:rPr lang="ja-JP" altLang="en-US"/>
               <a:t>マスター テキストの書式設定</a:t>
             </a:r>
           </a:p>
@@ -6316,7 +6320,7 @@
           <a:lstStyle/>
           <a:p>
             <a:r>
-              <a:rPr lang="ja-JP" altLang="en-US" smtClean="0"/>
+              <a:rPr lang="ja-JP" altLang="en-US"/>
               <a:t>マスター タイトルの書式設定</a:t>
             </a:r>
             <a:endParaRPr lang="en-US" dirty="0"/>
@@ -6350,67 +6354,67 @@
           <a:p>
             <a:pPr lvl="0"/>
             <a:r>
-              <a:rPr lang="ja-JP" altLang="en-US" smtClean="0"/>
+              <a:rPr lang="ja-JP" altLang="en-US"/>
               <a:t>マスター テキストの書式設定</a:t>
             </a:r>
           </a:p>
           <a:p>
             <a:pPr lvl="1"/>
             <a:r>
-              <a:rPr lang="ja-JP" altLang="en-US" smtClean="0"/>
+              <a:rPr lang="ja-JP" altLang="en-US"/>
               <a:t>第 </a:t>
             </a:r>
             <a:r>
-              <a:rPr lang="en-US" altLang="ja-JP" smtClean="0"/>
+              <a:rPr lang="en-US" altLang="ja-JP"/>
               <a:t>2 </a:t>
             </a:r>
             <a:r>
-              <a:rPr lang="ja-JP" altLang="en-US" smtClean="0"/>
+              <a:rPr lang="ja-JP" altLang="en-US"/>
               <a:t>レベル</a:t>
             </a:r>
           </a:p>
           <a:p>
             <a:pPr lvl="2"/>
             <a:r>
-              <a:rPr lang="ja-JP" altLang="en-US" smtClean="0"/>
+              <a:rPr lang="ja-JP" altLang="en-US"/>
               <a:t>第 </a:t>
             </a:r>
             <a:r>
-              <a:rPr lang="en-US" altLang="ja-JP" smtClean="0"/>
+              <a:rPr lang="en-US" altLang="ja-JP"/>
               <a:t>3 </a:t>
             </a:r>
             <a:r>
-              <a:rPr lang="ja-JP" altLang="en-US" smtClean="0"/>
+              <a:rPr lang="ja-JP" altLang="en-US"/>
               <a:t>レベル</a:t>
             </a:r>
           </a:p>
           <a:p>
             <a:pPr lvl="3"/>
             <a:r>
-              <a:rPr lang="ja-JP" altLang="en-US" smtClean="0"/>
+              <a:rPr lang="ja-JP" altLang="en-US"/>
               <a:t>第 </a:t>
             </a:r>
             <a:r>
-              <a:rPr lang="en-US" altLang="ja-JP" smtClean="0"/>
+              <a:rPr lang="en-US" altLang="ja-JP"/>
               <a:t>4 </a:t>
             </a:r>
             <a:r>
-              <a:rPr lang="ja-JP" altLang="en-US" smtClean="0"/>
+              <a:rPr lang="ja-JP" altLang="en-US"/>
               <a:t>レベル</a:t>
             </a:r>
           </a:p>
           <a:p>
             <a:pPr lvl="4"/>
             <a:r>
-              <a:rPr lang="ja-JP" altLang="en-US" smtClean="0"/>
+              <a:rPr lang="ja-JP" altLang="en-US"/>
               <a:t>第 </a:t>
             </a:r>
             <a:r>
-              <a:rPr lang="en-US" altLang="ja-JP" smtClean="0"/>
+              <a:rPr lang="en-US" altLang="ja-JP"/>
               <a:t>5 </a:t>
             </a:r>
             <a:r>
-              <a:rPr lang="ja-JP" altLang="en-US" smtClean="0"/>
+              <a:rPr lang="ja-JP" altLang="en-US"/>
               <a:t>レベル</a:t>
             </a:r>
             <a:endParaRPr lang="en-US" dirty="0"/>
@@ -7604,6 +7608,476 @@
 </p:sld>
 </file>
 
+<file path=ppt/slides/slide10.xml><?xml version="1.0" encoding="utf-8"?>
+<p:sld xmlns:a="http://schemas.openxmlformats.org/drawingml/2006/main" xmlns:r="http://schemas.openxmlformats.org/officeDocument/2006/relationships" xmlns:p="http://schemas.openxmlformats.org/presentationml/2006/main">
+  <p:cSld>
+    <p:spTree>
+      <p:nvGrpSpPr>
+        <p:cNvPr id="1" name=""/>
+        <p:cNvGrpSpPr/>
+        <p:nvPr/>
+      </p:nvGrpSpPr>
+      <p:grpSpPr>
+        <a:xfrm>
+          <a:off x="0" y="0"/>
+          <a:ext cx="0" cy="0"/>
+          <a:chOff x="0" y="0"/>
+          <a:chExt cx="0" cy="0"/>
+        </a:xfrm>
+      </p:grpSpPr>
+      <p:sp>
+        <p:nvSpPr>
+          <p:cNvPr id="2" name="タイトル 1">
+            <a:extLst>
+              <a:ext uri="{FF2B5EF4-FFF2-40B4-BE49-F238E27FC236}">
+                <a16:creationId xmlns:a16="http://schemas.microsoft.com/office/drawing/2014/main" xmlns="" id="{9A6E1FF1-5E4C-44E7-BC2B-114412F8541A}"/>
+              </a:ext>
+            </a:extLst>
+          </p:cNvPr>
+          <p:cNvSpPr>
+            <a:spLocks noGrp="1"/>
+          </p:cNvSpPr>
+          <p:nvPr>
+            <p:ph type="title"/>
+          </p:nvPr>
+        </p:nvSpPr>
+        <p:spPr>
+          <a:xfrm>
+            <a:off x="1251678" y="633845"/>
+            <a:ext cx="10178322" cy="1492132"/>
+          </a:xfrm>
+        </p:spPr>
+        <p:txBody>
+          <a:bodyPr/>
+          <a:lstStyle/>
+          <a:p>
+            <a:r>
+              <a:rPr kumimoji="1" lang="ja-JP" altLang="en-US" dirty="0"/>
+              <a:t>ご清聴ありがとうございました。</a:t>
+            </a:r>
+          </a:p>
+        </p:txBody>
+      </p:sp>
+      <p:sp>
+        <p:nvSpPr>
+          <p:cNvPr id="4" name="テキスト ボックス 3">
+            <a:extLst>
+              <a:ext uri="{FF2B5EF4-FFF2-40B4-BE49-F238E27FC236}">
+                <a16:creationId xmlns:a16="http://schemas.microsoft.com/office/drawing/2014/main" xmlns="" id="{7B7F6390-C097-4AB8-A212-8F3FA3CBDBB3}"/>
+              </a:ext>
+            </a:extLst>
+          </p:cNvPr>
+          <p:cNvSpPr txBox="1"/>
+          <p:nvPr/>
+        </p:nvSpPr>
+        <p:spPr>
+          <a:xfrm>
+            <a:off x="3182349" y="1573330"/>
+            <a:ext cx="6316980" cy="923330"/>
+          </a:xfrm>
+          <a:prstGeom prst="rect">
+            <a:avLst/>
+          </a:prstGeom>
+          <a:noFill/>
+        </p:spPr>
+        <p:txBody>
+          <a:bodyPr wrap="square" rtlCol="0">
+            <a:spAutoFit/>
+          </a:bodyPr>
+          <a:lstStyle/>
+          <a:p>
+            <a:r>
+              <a:rPr kumimoji="1" lang="en-US" altLang="ja-JP" dirty="0"/>
+              <a:t>※</a:t>
+            </a:r>
+            <a:r>
+              <a:rPr kumimoji="1" lang="ja-JP" altLang="en-US" dirty="0"/>
+              <a:t>このスライドの内容を実践して引き起こされた結果につきましては、当方は一切の責任を負いませんのであしからずご了承ください。</a:t>
+            </a:r>
+          </a:p>
+        </p:txBody>
+      </p:sp>
+      <p:sp>
+        <p:nvSpPr>
+          <p:cNvPr id="5" name="テキスト ボックス 4">
+            <a:extLst>
+              <a:ext uri="{FF2B5EF4-FFF2-40B4-BE49-F238E27FC236}">
+                <a16:creationId xmlns:a16="http://schemas.microsoft.com/office/drawing/2014/main" xmlns="" id="{98415D0E-45A0-4EEC-A142-DD333E5DEAF4}"/>
+              </a:ext>
+            </a:extLst>
+          </p:cNvPr>
+          <p:cNvSpPr txBox="1"/>
+          <p:nvPr/>
+        </p:nvSpPr>
+        <p:spPr>
+          <a:xfrm>
+            <a:off x="4708879" y="5577840"/>
+            <a:ext cx="3416320" cy="923330"/>
+          </a:xfrm>
+          <a:prstGeom prst="rect">
+            <a:avLst/>
+          </a:prstGeom>
+          <a:noFill/>
+        </p:spPr>
+        <p:txBody>
+          <a:bodyPr wrap="none" rtlCol="0">
+            <a:spAutoFit/>
+          </a:bodyPr>
+          <a:lstStyle/>
+          <a:p>
+            <a:pPr algn="ctr"/>
+            <a:r>
+              <a:rPr kumimoji="1" lang="ja-JP" altLang="en-US" dirty="0"/>
+              <a:t>ソフトウエア研究会</a:t>
+            </a:r>
+            <a:r>
+              <a:rPr kumimoji="1" lang="en-US" altLang="ja-JP" dirty="0"/>
+              <a:t>in</a:t>
+            </a:r>
+            <a:r>
+              <a:rPr kumimoji="1" lang="ja-JP" altLang="en-US" dirty="0"/>
+              <a:t>秋葉原</a:t>
+            </a:r>
+            <a:endParaRPr kumimoji="1" lang="en-US" altLang="ja-JP" dirty="0"/>
+          </a:p>
+          <a:p>
+            <a:pPr algn="ctr"/>
+            <a:r>
+              <a:rPr kumimoji="1" lang="ja-JP" altLang="en-US" dirty="0"/>
+              <a:t>有限会社テクニカルアーツ代表</a:t>
+            </a:r>
+            <a:endParaRPr kumimoji="1" lang="en-US" altLang="ja-JP" dirty="0"/>
+          </a:p>
+          <a:p>
+            <a:pPr algn="ctr"/>
+            <a:r>
+              <a:rPr kumimoji="1" lang="ja-JP" altLang="en-US" dirty="0"/>
+              <a:t>池田公平</a:t>
+            </a:r>
+          </a:p>
+        </p:txBody>
+      </p:sp>
+      <p:sp>
+        <p:nvSpPr>
+          <p:cNvPr id="6" name="タイトル 1">
+            <a:extLst>
+              <a:ext uri="{FF2B5EF4-FFF2-40B4-BE49-F238E27FC236}">
+                <a16:creationId xmlns:a16="http://schemas.microsoft.com/office/drawing/2014/main" xmlns="" id="{60453C65-5F4F-4304-A323-5424CE55402F}"/>
+              </a:ext>
+            </a:extLst>
+          </p:cNvPr>
+          <p:cNvSpPr txBox="1">
+            <a:spLocks/>
+          </p:cNvSpPr>
+          <p:nvPr/>
+        </p:nvSpPr>
+        <p:spPr>
+          <a:xfrm>
+            <a:off x="4814242" y="3183419"/>
+            <a:ext cx="3053194" cy="809417"/>
+          </a:xfrm>
+          <a:prstGeom prst="rect">
+            <a:avLst/>
+          </a:prstGeom>
+        </p:spPr>
+        <p:txBody>
+          <a:bodyPr vert="horz" lIns="91440" tIns="45720" rIns="91440" bIns="45720" rtlCol="0" anchor="t">
+            <a:normAutofit/>
+          </a:bodyPr>
+          <a:lstStyle>
+            <a:lvl1pPr algn="l" defTabSz="914400" rtl="0" eaLnBrk="1" latinLnBrk="0" hangingPunct="1">
+              <a:lnSpc>
+                <a:spcPct val="90000"/>
+              </a:lnSpc>
+              <a:spcBef>
+                <a:spcPct val="0"/>
+              </a:spcBef>
+              <a:buNone/>
+              <a:defRPr kumimoji="1" sz="5100" kern="1200" cap="all" spc="200" baseline="0">
+                <a:solidFill>
+                  <a:schemeClr val="tx2"/>
+                </a:solidFill>
+                <a:latin typeface="+mj-lt"/>
+                <a:ea typeface="+mj-ea"/>
+                <a:cs typeface="+mj-cs"/>
+              </a:defRPr>
+            </a:lvl1pPr>
+          </a:lstStyle>
+          <a:p>
+            <a:r>
+              <a:rPr lang="ja-JP" altLang="en-US" smtClean="0"/>
+              <a:t>次回予告</a:t>
+            </a:r>
+            <a:endParaRPr lang="ja-JP" altLang="en-US" dirty="0"/>
+          </a:p>
+        </p:txBody>
+      </p:sp>
+      <p:sp>
+        <p:nvSpPr>
+          <p:cNvPr id="7" name="四角形: 角を丸くする 3">
+            <a:extLst>
+              <a:ext uri="{FF2B5EF4-FFF2-40B4-BE49-F238E27FC236}">
+                <a16:creationId xmlns:a16="http://schemas.microsoft.com/office/drawing/2014/main" xmlns="" id="{826EE748-8BBA-4128-A236-720D6FF7088B}"/>
+              </a:ext>
+            </a:extLst>
+          </p:cNvPr>
+          <p:cNvSpPr/>
+          <p:nvPr/>
+        </p:nvSpPr>
+        <p:spPr>
+          <a:xfrm>
+            <a:off x="3616689" y="3992836"/>
+            <a:ext cx="5448300" cy="1455464"/>
+          </a:xfrm>
+          <a:prstGeom prst="roundRect">
+            <a:avLst/>
+          </a:prstGeom>
+        </p:spPr>
+        <p:style>
+          <a:lnRef idx="2">
+            <a:schemeClr val="accent1">
+              <a:shade val="50000"/>
+            </a:schemeClr>
+          </a:lnRef>
+          <a:fillRef idx="1">
+            <a:schemeClr val="accent1"/>
+          </a:fillRef>
+          <a:effectRef idx="0">
+            <a:schemeClr val="accent1"/>
+          </a:effectRef>
+          <a:fontRef idx="minor">
+            <a:schemeClr val="lt1"/>
+          </a:fontRef>
+        </p:style>
+        <p:txBody>
+          <a:bodyPr rtlCol="0" anchor="ctr"/>
+          <a:lstStyle/>
+          <a:p>
+            <a:pPr algn="ctr"/>
+            <a:r>
+              <a:rPr kumimoji="1" lang="en-US" altLang="ja-JP" sz="2800" dirty="0">
+                <a:solidFill>
+                  <a:schemeClr val="tx1"/>
+                </a:solidFill>
+                <a:latin typeface="Berlin Sans FB Demi" panose="020E0802020502020306" pitchFamily="34" charset="0"/>
+              </a:rPr>
+              <a:t>HAPPY-Epsode3</a:t>
+            </a:r>
+          </a:p>
+          <a:p>
+            <a:pPr algn="ctr"/>
+            <a:r>
+              <a:rPr kumimoji="1" lang="ja-JP" altLang="en-US" sz="2800" dirty="0" smtClean="0">
+                <a:solidFill>
+                  <a:schemeClr val="tx1"/>
+                </a:solidFill>
+                <a:latin typeface="ＤＦＰ綜藝体W7" panose="040B0700000000000000" pitchFamily="50" charset="-128"/>
+                <a:ea typeface="ＤＦＰ綜藝体W7" panose="040B0700000000000000" pitchFamily="50" charset="-128"/>
+              </a:rPr>
+              <a:t>ダークサイドエンジニア</a:t>
+            </a:r>
+            <a:endParaRPr kumimoji="1" lang="en-US" altLang="ja-JP" sz="2800" dirty="0" smtClean="0">
+              <a:solidFill>
+                <a:schemeClr val="tx1"/>
+              </a:solidFill>
+              <a:latin typeface="ＤＦＰ綜藝体W7" panose="040B0700000000000000" pitchFamily="50" charset="-128"/>
+              <a:ea typeface="ＤＦＰ綜藝体W7" panose="040B0700000000000000" pitchFamily="50" charset="-128"/>
+            </a:endParaRPr>
+          </a:p>
+          <a:p>
+            <a:pPr algn="ctr"/>
+            <a:r>
+              <a:rPr kumimoji="1" lang="ja-JP" altLang="en-US" sz="2800" dirty="0" smtClean="0">
+                <a:solidFill>
+                  <a:schemeClr val="tx1"/>
+                </a:solidFill>
+                <a:latin typeface="ＤＦＰ綜藝体W7" panose="040B0700000000000000" pitchFamily="50" charset="-128"/>
+                <a:ea typeface="ＤＦＰ綜藝体W7" panose="040B0700000000000000" pitchFamily="50" charset="-128"/>
+              </a:rPr>
+              <a:t>怒りを乗り越えよ</a:t>
+            </a:r>
+            <a:endParaRPr kumimoji="1" lang="ja-JP" altLang="en-US" sz="2800" dirty="0">
+              <a:solidFill>
+                <a:schemeClr val="tx1"/>
+              </a:solidFill>
+              <a:latin typeface="ＤＦＰ綜藝体W7" panose="040B0700000000000000" pitchFamily="50" charset="-128"/>
+              <a:ea typeface="ＤＦＰ綜藝体W7" panose="040B0700000000000000" pitchFamily="50" charset="-128"/>
+            </a:endParaRPr>
+          </a:p>
+        </p:txBody>
+      </p:sp>
+    </p:spTree>
+    <p:extLst>
+      <p:ext uri="{BB962C8B-B14F-4D97-AF65-F5344CB8AC3E}">
+        <p14:creationId xmlns:p14="http://schemas.microsoft.com/office/powerpoint/2010/main" val="2234897559"/>
+      </p:ext>
+    </p:extLst>
+  </p:cSld>
+  <p:clrMapOvr>
+    <a:masterClrMapping/>
+  </p:clrMapOvr>
+</p:sld>
+</file>
+
+<file path=ppt/slides/slide11.xml><?xml version="1.0" encoding="utf-8"?>
+<p:sld xmlns:a="http://schemas.openxmlformats.org/drawingml/2006/main" xmlns:r="http://schemas.openxmlformats.org/officeDocument/2006/relationships" xmlns:p="http://schemas.openxmlformats.org/presentationml/2006/main">
+  <p:cSld>
+    <p:spTree>
+      <p:nvGrpSpPr>
+        <p:cNvPr id="1" name=""/>
+        <p:cNvGrpSpPr/>
+        <p:nvPr/>
+      </p:nvGrpSpPr>
+      <p:grpSpPr>
+        <a:xfrm>
+          <a:off x="0" y="0"/>
+          <a:ext cx="0" cy="0"/>
+          <a:chOff x="0" y="0"/>
+          <a:chExt cx="0" cy="0"/>
+        </a:xfrm>
+      </p:grpSpPr>
+      <p:sp>
+        <p:nvSpPr>
+          <p:cNvPr id="2" name="タイトル 1"/>
+          <p:cNvSpPr>
+            <a:spLocks noGrp="1"/>
+          </p:cNvSpPr>
+          <p:nvPr>
+            <p:ph type="title"/>
+          </p:nvPr>
+        </p:nvSpPr>
+        <p:spPr>
+          <a:xfrm>
+            <a:off x="1251678" y="382385"/>
+            <a:ext cx="10178322" cy="788869"/>
+          </a:xfrm>
+        </p:spPr>
+        <p:txBody>
+          <a:bodyPr>
+            <a:normAutofit fontScale="90000"/>
+          </a:bodyPr>
+          <a:lstStyle/>
+          <a:p>
+            <a:r>
+              <a:rPr kumimoji="1" lang="ja-JP" altLang="en-US"/>
+              <a:t>メモ</a:t>
+            </a:r>
+          </a:p>
+        </p:txBody>
+      </p:sp>
+      <p:sp>
+        <p:nvSpPr>
+          <p:cNvPr id="3" name="コンテンツ プレースホルダー 2"/>
+          <p:cNvSpPr>
+            <a:spLocks noGrp="1"/>
+          </p:cNvSpPr>
+          <p:nvPr>
+            <p:ph idx="1"/>
+          </p:nvPr>
+        </p:nvSpPr>
+        <p:spPr>
+          <a:xfrm>
+            <a:off x="1251678" y="1325367"/>
+            <a:ext cx="10178322" cy="4554226"/>
+          </a:xfrm>
+        </p:spPr>
+        <p:txBody>
+          <a:bodyPr>
+            <a:normAutofit lnSpcReduction="10000"/>
+          </a:bodyPr>
+          <a:lstStyle/>
+          <a:p>
+            <a:r>
+              <a:rPr lang="ja-JP" altLang="en-US" dirty="0"/>
+              <a:t>老害エンジニアの典型</a:t>
+            </a:r>
+            <a:endParaRPr lang="en-US" altLang="ja-JP" dirty="0"/>
+          </a:p>
+          <a:p>
+            <a:r>
+              <a:rPr kumimoji="1" lang="ja-JP" altLang="en-US" dirty="0"/>
+              <a:t>知識と経験がもたらすもの</a:t>
+            </a:r>
+            <a:endParaRPr kumimoji="1" lang="en-US" altLang="ja-JP" dirty="0"/>
+          </a:p>
+          <a:p>
+            <a:r>
+              <a:rPr lang="ja-JP" altLang="en-US" dirty="0"/>
+              <a:t>エンジニアの上下関係</a:t>
+            </a:r>
+            <a:endParaRPr lang="en-US" altLang="ja-JP" dirty="0"/>
+          </a:p>
+          <a:p>
+            <a:r>
+              <a:rPr kumimoji="1" lang="ja-JP" altLang="en-US" dirty="0"/>
+              <a:t>こだわりの災い</a:t>
+            </a:r>
+            <a:endParaRPr kumimoji="1" lang="en-US" altLang="ja-JP" dirty="0"/>
+          </a:p>
+          <a:p>
+            <a:r>
+              <a:rPr lang="ja-JP" altLang="en-US" dirty="0"/>
+              <a:t>縛りプレイ</a:t>
+            </a:r>
+            <a:endParaRPr lang="en-US" altLang="ja-JP" dirty="0"/>
+          </a:p>
+          <a:p>
+            <a:r>
+              <a:rPr kumimoji="1" lang="ja-JP" altLang="en-US" dirty="0"/>
+              <a:t>一本の道筋</a:t>
+            </a:r>
+            <a:endParaRPr kumimoji="1" lang="en-US" altLang="ja-JP" dirty="0"/>
+          </a:p>
+          <a:p>
+            <a:r>
+              <a:rPr kumimoji="1" lang="ja-JP" altLang="en-US" dirty="0"/>
+              <a:t>「なんで」という問いに答えはない</a:t>
+            </a:r>
+            <a:endParaRPr kumimoji="1" lang="en-US" altLang="ja-JP" dirty="0"/>
+          </a:p>
+          <a:p>
+            <a:r>
+              <a:rPr lang="ja-JP" altLang="en-US" dirty="0"/>
+              <a:t>古い技術と新しい技術</a:t>
+            </a:r>
+            <a:endParaRPr lang="en-US" altLang="ja-JP" dirty="0"/>
+          </a:p>
+          <a:p>
+            <a:r>
+              <a:rPr lang="ja-JP" altLang="en-US" dirty="0"/>
+              <a:t>老害エンジニアの撃退方法</a:t>
+            </a:r>
+            <a:endParaRPr lang="en-US" altLang="ja-JP" dirty="0"/>
+          </a:p>
+          <a:p>
+            <a:r>
+              <a:rPr kumimoji="1" lang="ja-JP" altLang="en-US" dirty="0"/>
+              <a:t>思考停止</a:t>
+            </a:r>
+            <a:endParaRPr kumimoji="1" lang="en-US" altLang="ja-JP" dirty="0"/>
+          </a:p>
+          <a:p>
+            <a:r>
+              <a:rPr lang="ja-JP" altLang="en-US" dirty="0"/>
+              <a:t>視野を広げる</a:t>
+            </a:r>
+            <a:endParaRPr kumimoji="1" lang="ja-JP" altLang="en-US" dirty="0"/>
+          </a:p>
+        </p:txBody>
+      </p:sp>
+    </p:spTree>
+    <p:extLst>
+      <p:ext uri="{BB962C8B-B14F-4D97-AF65-F5344CB8AC3E}">
+        <p14:creationId xmlns:p14="http://schemas.microsoft.com/office/powerpoint/2010/main" val="901569726"/>
+      </p:ext>
+    </p:extLst>
+  </p:cSld>
+  <p:clrMapOvr>
+    <a:masterClrMapping/>
+  </p:clrMapOvr>
+</p:sld>
+</file>
+
 <file path=ppt/slides/slide2.xml><?xml version="1.0" encoding="utf-8"?>
 <p:sld xmlns:a="http://schemas.openxmlformats.org/drawingml/2006/main" xmlns:r="http://schemas.openxmlformats.org/officeDocument/2006/relationships" xmlns:p="http://schemas.openxmlformats.org/presentationml/2006/main">
   <p:cSld>
@@ -7654,22 +8128,23 @@
             <p:ph idx="1"/>
           </p:nvPr>
         </p:nvSpPr>
-        <p:spPr/>
+        <p:spPr>
+          <a:xfrm>
+            <a:off x="1251678" y="1536700"/>
+            <a:ext cx="10178322" cy="5067299"/>
+          </a:xfrm>
+        </p:spPr>
         <p:txBody>
           <a:bodyPr>
-            <a:normAutofit fontScale="85000" lnSpcReduction="20000"/>
+            <a:normAutofit/>
           </a:bodyPr>
           <a:lstStyle/>
           <a:p>
             <a:r>
               <a:rPr lang="ja-JP" altLang="en-US" dirty="0"/>
-              <a:t>名前 池田公平　ペンネーム　五代</a:t>
-            </a:r>
-            <a:r>
-              <a:rPr lang="ja-JP" altLang="en-US" dirty="0" smtClean="0"/>
-              <a:t>響</a:t>
-            </a:r>
-            <a:endParaRPr lang="en-US" altLang="ja-JP" dirty="0" smtClean="0"/>
+              <a:t>名前 池田公平　ペンネーム　五代響</a:t>
+            </a:r>
+            <a:endParaRPr lang="en-US" altLang="ja-JP" dirty="0"/>
           </a:p>
           <a:p>
             <a:r>
@@ -7696,49 +8171,49 @@
           </a:p>
           <a:p>
             <a:r>
-              <a:rPr lang="ja-JP" altLang="en-US" dirty="0" smtClean="0"/>
+              <a:rPr lang="ja-JP" altLang="en-US" dirty="0"/>
               <a:t>職業 ソフトウエアエンジニア </a:t>
             </a:r>
             <a:r>
-              <a:rPr lang="en-US" altLang="ja-JP" dirty="0" smtClean="0"/>
+              <a:rPr lang="en-US" altLang="ja-JP" dirty="0"/>
               <a:t>(C++</a:t>
             </a:r>
             <a:r>
-              <a:rPr lang="ja-JP" altLang="en-US" dirty="0" smtClean="0"/>
+              <a:rPr lang="ja-JP" altLang="en-US" dirty="0"/>
               <a:t>とアセンブラが大好き</a:t>
             </a:r>
             <a:r>
-              <a:rPr lang="en-US" altLang="ja-JP" dirty="0" smtClean="0"/>
+              <a:rPr lang="en-US" altLang="ja-JP" dirty="0"/>
               <a:t>)</a:t>
             </a:r>
           </a:p>
           <a:p>
             <a:pPr lvl="1"/>
             <a:r>
-              <a:rPr lang="ja-JP" altLang="en-US" dirty="0" smtClean="0"/>
+              <a:rPr lang="ja-JP" altLang="en-US" dirty="0"/>
               <a:t>副業　会社社長、コンサルタント、  </a:t>
             </a:r>
             <a:r>
-              <a:rPr lang="en-US" altLang="ja-JP" dirty="0" smtClean="0"/>
+              <a:rPr lang="en-US" altLang="ja-JP" dirty="0"/>
               <a:t>GAME MUSIC </a:t>
             </a:r>
             <a:r>
-              <a:rPr lang="ja-JP" altLang="en-US" dirty="0" smtClean="0"/>
+              <a:rPr lang="ja-JP" altLang="en-US" dirty="0"/>
               <a:t>コンポーサ</a:t>
             </a:r>
             <a:endParaRPr lang="en-US" altLang="ja-JP" dirty="0"/>
           </a:p>
           <a:p>
             <a:r>
-              <a:rPr lang="ja-JP" altLang="en-US" dirty="0" smtClean="0"/>
+              <a:rPr lang="ja-JP" altLang="en-US" dirty="0"/>
               <a:t>略歴</a:t>
             </a:r>
-            <a:endParaRPr lang="en-US" altLang="ja-JP" dirty="0" smtClean="0"/>
+            <a:endParaRPr lang="en-US" altLang="ja-JP" dirty="0"/>
           </a:p>
           <a:p>
             <a:pPr lvl="1"/>
             <a:r>
-              <a:rPr lang="en-US" altLang="ja-JP" dirty="0" smtClean="0"/>
+              <a:rPr lang="en-US" altLang="ja-JP" dirty="0"/>
               <a:t>1977</a:t>
             </a:r>
             <a:r>
@@ -7750,16 +8225,12 @@
           <a:p>
             <a:pPr lvl="1"/>
             <a:r>
-              <a:rPr lang="en-US" altLang="ja-JP" dirty="0" smtClean="0"/>
+              <a:rPr lang="en-US" altLang="ja-JP" dirty="0"/>
               <a:t>1980</a:t>
             </a:r>
             <a:r>
-              <a:rPr lang="ja-JP" altLang="en-US" dirty="0" smtClean="0"/>
-              <a:t>年ごろ</a:t>
-            </a:r>
-            <a:r>
               <a:rPr lang="ja-JP" altLang="en-US" dirty="0"/>
-              <a:t>、（株）アスキーで</a:t>
+              <a:t>年ごろ、（株）アスキーで</a:t>
             </a:r>
             <a:r>
               <a:rPr lang="en-US" altLang="ja-JP" dirty="0"/>
@@ -7818,11 +8289,7 @@
           <a:p>
             <a:r>
               <a:rPr lang="ja-JP" altLang="en-US" dirty="0"/>
-              <a:t>好きな事　オートバイレース、スキー、ワイン、</a:t>
-            </a:r>
-            <a:r>
-              <a:rPr lang="ja-JP" altLang="en-US" dirty="0" smtClean="0"/>
-              <a:t>写真、鉄道、テニス</a:t>
+              <a:t>好きな事　オートバイレース、スキー、ワイン、写真、鉄道、テニス</a:t>
             </a:r>
             <a:endParaRPr lang="en-US" altLang="ja-JP" dirty="0"/>
           </a:p>
@@ -7869,58 +8336,204 @@
         </p:nvSpPr>
         <p:spPr>
           <a:xfrm>
-            <a:off x="2559264" y="2046983"/>
-            <a:ext cx="8263801" cy="1754326"/>
+            <a:off x="2271533" y="537159"/>
+            <a:ext cx="7549179" cy="5822871"/>
           </a:xfrm>
-          <a:prstGeom prst="rect">
+          <a:prstGeom prst="roundRect">
             <a:avLst/>
           </a:prstGeom>
-          <a:noFill/>
+          <a:ln/>
         </p:spPr>
+        <p:style>
+          <a:lnRef idx="0">
+            <a:schemeClr val="dk1"/>
+          </a:lnRef>
+          <a:fillRef idx="3">
+            <a:schemeClr val="dk1"/>
+          </a:fillRef>
+          <a:effectRef idx="3">
+            <a:schemeClr val="dk1"/>
+          </a:effectRef>
+          <a:fontRef idx="minor">
+            <a:schemeClr val="lt1"/>
+          </a:fontRef>
+        </p:style>
         <p:txBody>
           <a:bodyPr wrap="none" rtlCol="0">
             <a:spAutoFit/>
           </a:bodyPr>
           <a:lstStyle/>
           <a:p>
-            <a:pPr algn="ctr"/>
-            <a:r>
-              <a:rPr kumimoji="1" lang="ja-JP" altLang="en-US" dirty="0" smtClean="0"/>
+            <a:pPr algn="ctr">
+              <a:lnSpc>
+                <a:spcPct val="150000"/>
+              </a:lnSpc>
+            </a:pPr>
+            <a:r>
+              <a:rPr kumimoji="1" lang="ja-JP" altLang="en-US" sz="2800" dirty="0">
+                <a:solidFill>
+                  <a:srgbClr val="FF0000"/>
+                </a:solidFill>
+                <a:latin typeface="ＤＦＰ麗雅宋" panose="02020900000000000000" pitchFamily="18" charset="-128"/>
+                <a:ea typeface="ＤＦＰ麗雅宋" panose="02020900000000000000" pitchFamily="18" charset="-128"/>
+              </a:rPr>
               <a:t>ご注意</a:t>
             </a:r>
-            <a:endParaRPr kumimoji="1" lang="en-US" altLang="ja-JP" dirty="0" smtClean="0"/>
-          </a:p>
-          <a:p>
-            <a:pPr algn="ctr"/>
-            <a:endParaRPr kumimoji="1" lang="en-US" altLang="ja-JP" dirty="0"/>
-          </a:p>
-          <a:p>
-            <a:pPr algn="ctr"/>
-            <a:r>
-              <a:rPr kumimoji="1" lang="ja-JP" altLang="en-US" dirty="0" smtClean="0"/>
+            <a:endParaRPr kumimoji="1" lang="en-US" altLang="ja-JP" sz="2800" dirty="0">
+              <a:solidFill>
+                <a:srgbClr val="FF0000"/>
+              </a:solidFill>
+              <a:latin typeface="ＤＦＰ麗雅宋" panose="02020900000000000000" pitchFamily="18" charset="-128"/>
+              <a:ea typeface="ＤＦＰ麗雅宋" panose="02020900000000000000" pitchFamily="18" charset="-128"/>
+            </a:endParaRPr>
+          </a:p>
+          <a:p>
+            <a:pPr algn="ctr">
+              <a:lnSpc>
+                <a:spcPct val="150000"/>
+              </a:lnSpc>
+            </a:pPr>
+            <a:endParaRPr kumimoji="1" lang="en-US" altLang="ja-JP" sz="2800" dirty="0">
+              <a:solidFill>
+                <a:srgbClr val="FF0000"/>
+              </a:solidFill>
+              <a:latin typeface="ＤＦＰ麗雅宋" panose="02020900000000000000" pitchFamily="18" charset="-128"/>
+              <a:ea typeface="ＤＦＰ麗雅宋" panose="02020900000000000000" pitchFamily="18" charset="-128"/>
+            </a:endParaRPr>
+          </a:p>
+          <a:p>
+            <a:pPr algn="ctr">
+              <a:lnSpc>
+                <a:spcPct val="150000"/>
+              </a:lnSpc>
+            </a:pPr>
+            <a:r>
+              <a:rPr kumimoji="1" lang="ja-JP" altLang="en-US" sz="2800" dirty="0">
+                <a:solidFill>
+                  <a:srgbClr val="FF0000"/>
+                </a:solidFill>
+                <a:latin typeface="ＤＦＰ麗雅宋" panose="02020900000000000000" pitchFamily="18" charset="-128"/>
+                <a:ea typeface="ＤＦＰ麗雅宋" panose="02020900000000000000" pitchFamily="18" charset="-128"/>
+              </a:rPr>
               <a:t>本編は、池田の経験に基づく内容で、</a:t>
             </a:r>
-            <a:endParaRPr kumimoji="1" lang="en-US" altLang="ja-JP" dirty="0" smtClean="0"/>
-          </a:p>
-          <a:p>
-            <a:pPr algn="ctr"/>
-            <a:r>
-              <a:rPr kumimoji="1" lang="ja-JP" altLang="en-US" dirty="0" smtClean="0"/>
-              <a:t>池田本人が老害と戦いながら得た事柄をまとめたものです。</a:t>
-            </a:r>
-            <a:endParaRPr kumimoji="1" lang="en-US" altLang="ja-JP" dirty="0" smtClean="0"/>
-          </a:p>
-          <a:p>
-            <a:pPr algn="ctr"/>
-            <a:r>
-              <a:rPr kumimoji="1" lang="ja-JP" altLang="en-US" dirty="0" smtClean="0"/>
-              <a:t>したがって、同世代のエンジニアに必ずしも当てはまる内容ではござません。</a:t>
-            </a:r>
-            <a:endParaRPr kumimoji="1" lang="en-US" altLang="ja-JP" dirty="0" smtClean="0"/>
-          </a:p>
-          <a:p>
-            <a:pPr algn="ctr"/>
-            <a:endParaRPr kumimoji="1" lang="ja-JP" altLang="en-US" dirty="0"/>
+            <a:endParaRPr kumimoji="1" lang="en-US" altLang="ja-JP" sz="2800" dirty="0">
+              <a:solidFill>
+                <a:srgbClr val="FF0000"/>
+              </a:solidFill>
+              <a:latin typeface="ＤＦＰ麗雅宋" panose="02020900000000000000" pitchFamily="18" charset="-128"/>
+              <a:ea typeface="ＤＦＰ麗雅宋" panose="02020900000000000000" pitchFamily="18" charset="-128"/>
+            </a:endParaRPr>
+          </a:p>
+          <a:p>
+            <a:pPr algn="ctr">
+              <a:lnSpc>
+                <a:spcPct val="150000"/>
+              </a:lnSpc>
+            </a:pPr>
+            <a:r>
+              <a:rPr kumimoji="1" lang="ja-JP" altLang="en-US" sz="2800" dirty="0">
+                <a:solidFill>
+                  <a:srgbClr val="FF0000"/>
+                </a:solidFill>
+                <a:latin typeface="ＤＦＰ麗雅宋" panose="02020900000000000000" pitchFamily="18" charset="-128"/>
+                <a:ea typeface="ＤＦＰ麗雅宋" panose="02020900000000000000" pitchFamily="18" charset="-128"/>
+              </a:rPr>
+              <a:t>池田本人が老害と戦いながら</a:t>
+            </a:r>
+            <a:endParaRPr kumimoji="1" lang="en-US" altLang="ja-JP" sz="2800" dirty="0">
+              <a:solidFill>
+                <a:srgbClr val="FF0000"/>
+              </a:solidFill>
+              <a:latin typeface="ＤＦＰ麗雅宋" panose="02020900000000000000" pitchFamily="18" charset="-128"/>
+              <a:ea typeface="ＤＦＰ麗雅宋" panose="02020900000000000000" pitchFamily="18" charset="-128"/>
+            </a:endParaRPr>
+          </a:p>
+          <a:p>
+            <a:pPr algn="ctr">
+              <a:lnSpc>
+                <a:spcPct val="150000"/>
+              </a:lnSpc>
+            </a:pPr>
+            <a:r>
+              <a:rPr kumimoji="1" lang="ja-JP" altLang="en-US" sz="2800" dirty="0">
+                <a:solidFill>
+                  <a:srgbClr val="FF0000"/>
+                </a:solidFill>
+                <a:latin typeface="ＤＦＰ麗雅宋" panose="02020900000000000000" pitchFamily="18" charset="-128"/>
+                <a:ea typeface="ＤＦＰ麗雅宋" panose="02020900000000000000" pitchFamily="18" charset="-128"/>
+              </a:rPr>
+              <a:t>得た事柄をまとめたものです。</a:t>
+            </a:r>
+            <a:endParaRPr kumimoji="1" lang="en-US" altLang="ja-JP" sz="2800" dirty="0">
+              <a:solidFill>
+                <a:srgbClr val="FF0000"/>
+              </a:solidFill>
+              <a:latin typeface="ＤＦＰ麗雅宋" panose="02020900000000000000" pitchFamily="18" charset="-128"/>
+              <a:ea typeface="ＤＦＰ麗雅宋" panose="02020900000000000000" pitchFamily="18" charset="-128"/>
+            </a:endParaRPr>
+          </a:p>
+          <a:p>
+            <a:pPr algn="ctr">
+              <a:lnSpc>
+                <a:spcPct val="150000"/>
+              </a:lnSpc>
+            </a:pPr>
+            <a:r>
+              <a:rPr kumimoji="1" lang="ja-JP" altLang="en-US" sz="2800" dirty="0">
+                <a:solidFill>
+                  <a:srgbClr val="FF0000"/>
+                </a:solidFill>
+                <a:latin typeface="ＤＦＰ麗雅宋" panose="02020900000000000000" pitchFamily="18" charset="-128"/>
+                <a:ea typeface="ＤＦＰ麗雅宋" panose="02020900000000000000" pitchFamily="18" charset="-128"/>
+              </a:rPr>
+              <a:t>したがって、同世代のエンジニアに</a:t>
+            </a:r>
+            <a:endParaRPr kumimoji="1" lang="en-US" altLang="ja-JP" sz="2800" dirty="0">
+              <a:solidFill>
+                <a:srgbClr val="FF0000"/>
+              </a:solidFill>
+              <a:latin typeface="ＤＦＰ麗雅宋" panose="02020900000000000000" pitchFamily="18" charset="-128"/>
+              <a:ea typeface="ＤＦＰ麗雅宋" panose="02020900000000000000" pitchFamily="18" charset="-128"/>
+            </a:endParaRPr>
+          </a:p>
+          <a:p>
+            <a:pPr algn="ctr">
+              <a:lnSpc>
+                <a:spcPct val="150000"/>
+              </a:lnSpc>
+            </a:pPr>
+            <a:r>
+              <a:rPr kumimoji="1" lang="ja-JP" altLang="en-US" sz="2800" dirty="0">
+                <a:solidFill>
+                  <a:srgbClr val="FF0000"/>
+                </a:solidFill>
+                <a:latin typeface="ＤＦＰ麗雅宋" panose="02020900000000000000" pitchFamily="18" charset="-128"/>
+                <a:ea typeface="ＤＦＰ麗雅宋" panose="02020900000000000000" pitchFamily="18" charset="-128"/>
+              </a:rPr>
+              <a:t>必ずしも当てはまる内容ではござません。</a:t>
+            </a:r>
+            <a:endParaRPr kumimoji="1" lang="en-US" altLang="ja-JP" sz="2800" dirty="0">
+              <a:solidFill>
+                <a:srgbClr val="FF0000"/>
+              </a:solidFill>
+              <a:latin typeface="ＤＦＰ麗雅宋" panose="02020900000000000000" pitchFamily="18" charset="-128"/>
+              <a:ea typeface="ＤＦＰ麗雅宋" panose="02020900000000000000" pitchFamily="18" charset="-128"/>
+            </a:endParaRPr>
+          </a:p>
+          <a:p>
+            <a:pPr algn="ctr">
+              <a:lnSpc>
+                <a:spcPct val="150000"/>
+              </a:lnSpc>
+            </a:pPr>
+            <a:endParaRPr kumimoji="1" lang="ja-JP" altLang="en-US" sz="2800" dirty="0">
+              <a:solidFill>
+                <a:srgbClr val="FF0000"/>
+              </a:solidFill>
+              <a:latin typeface="ＤＦＰ麗雅宋" panose="02020900000000000000" pitchFamily="18" charset="-128"/>
+              <a:ea typeface="ＤＦＰ麗雅宋" panose="02020900000000000000" pitchFamily="18" charset="-128"/>
+            </a:endParaRPr>
           </a:p>
         </p:txBody>
       </p:sp>
@@ -8100,120 +8713,912 @@
             <p:ph type="title"/>
           </p:nvPr>
         </p:nvSpPr>
-        <p:spPr>
-          <a:xfrm>
-            <a:off x="1251678" y="382385"/>
-            <a:ext cx="10178322" cy="788869"/>
-          </a:xfrm>
-        </p:spPr>
-        <p:txBody>
-          <a:bodyPr>
-            <a:normAutofit fontScale="90000"/>
-          </a:bodyPr>
-          <a:lstStyle/>
-          <a:p>
-            <a:r>
-              <a:rPr kumimoji="1" lang="ja-JP" altLang="en-US" smtClean="0"/>
-              <a:t>メモ</a:t>
-            </a:r>
-            <a:endParaRPr kumimoji="1" lang="ja-JP" altLang="en-US"/>
-          </a:p>
-        </p:txBody>
-      </p:sp>
-      <p:sp>
-        <p:nvSpPr>
-          <p:cNvPr id="3" name="コンテンツ プレースホルダー 2"/>
-          <p:cNvSpPr>
-            <a:spLocks noGrp="1"/>
-          </p:cNvSpPr>
-          <p:nvPr>
-            <p:ph idx="1"/>
-          </p:nvPr>
-        </p:nvSpPr>
-        <p:spPr>
-          <a:xfrm>
-            <a:off x="1251678" y="1325367"/>
-            <a:ext cx="10178322" cy="4554226"/>
-          </a:xfrm>
-        </p:spPr>
+        <p:spPr/>
         <p:txBody>
           <a:bodyPr/>
           <a:lstStyle/>
           <a:p>
             <a:r>
-              <a:rPr kumimoji="1" lang="ja-JP" altLang="en-US" dirty="0" smtClean="0"/>
-              <a:t>知識と経験がもたらすもの</a:t>
-            </a:r>
-            <a:endParaRPr kumimoji="1" lang="en-US" altLang="ja-JP" dirty="0" smtClean="0"/>
-          </a:p>
-          <a:p>
-            <a:r>
-              <a:rPr lang="ja-JP" altLang="en-US" dirty="0" smtClean="0"/>
-              <a:t>エンジニアの上下関係</a:t>
-            </a:r>
-            <a:endParaRPr lang="en-US" altLang="ja-JP" dirty="0" smtClean="0"/>
-          </a:p>
-          <a:p>
-            <a:r>
-              <a:rPr kumimoji="1" lang="ja-JP" altLang="en-US" dirty="0" smtClean="0"/>
-              <a:t>こだわりの災い</a:t>
-            </a:r>
-            <a:endParaRPr kumimoji="1" lang="en-US" altLang="ja-JP" dirty="0" smtClean="0"/>
-          </a:p>
-          <a:p>
-            <a:r>
-              <a:rPr lang="ja-JP" altLang="en-US" dirty="0" smtClean="0"/>
-              <a:t>縛りプレイ</a:t>
-            </a:r>
-            <a:endParaRPr lang="en-US" altLang="ja-JP" dirty="0" smtClean="0"/>
-          </a:p>
-          <a:p>
-            <a:r>
-              <a:rPr kumimoji="1" lang="ja-JP" altLang="en-US" dirty="0" smtClean="0"/>
-              <a:t>一本の道筋</a:t>
-            </a:r>
-            <a:endParaRPr kumimoji="1" lang="en-US" altLang="ja-JP" dirty="0" smtClean="0"/>
-          </a:p>
-          <a:p>
-            <a:r>
-              <a:rPr kumimoji="1" lang="ja-JP" altLang="en-US" dirty="0" smtClean="0"/>
-              <a:t>「なんで」という問いに答えはない</a:t>
-            </a:r>
-            <a:endParaRPr kumimoji="1" lang="en-US" altLang="ja-JP" dirty="0" smtClean="0"/>
-          </a:p>
-          <a:p>
-            <a:r>
-              <a:rPr lang="ja-JP" altLang="en-US" dirty="0" smtClean="0"/>
-              <a:t>古い技術と新しい技術</a:t>
-            </a:r>
-            <a:endParaRPr lang="en-US" altLang="ja-JP" dirty="0" smtClean="0"/>
-          </a:p>
-          <a:p>
-            <a:r>
-              <a:rPr kumimoji="1" lang="ja-JP" altLang="en-US" dirty="0" smtClean="0"/>
-              <a:t>老害エンジニアの典型</a:t>
-            </a:r>
-            <a:endParaRPr kumimoji="1" lang="en-US" altLang="ja-JP" dirty="0" smtClean="0"/>
-          </a:p>
-          <a:p>
-            <a:r>
-              <a:rPr lang="ja-JP" altLang="en-US" dirty="0" smtClean="0"/>
-              <a:t>老害エンジニアの撃退方法</a:t>
-            </a:r>
-            <a:endParaRPr kumimoji="1" lang="ja-JP" altLang="en-US" dirty="0"/>
+              <a:rPr kumimoji="1" lang="ja-JP" altLang="en-US" dirty="0"/>
+              <a:t>老害エンジニア</a:t>
+            </a:r>
+          </a:p>
+        </p:txBody>
+      </p:sp>
+      <p:pic>
+        <p:nvPicPr>
+          <p:cNvPr id="4" name="図 3"/>
+          <p:cNvPicPr>
+            <a:picLocks noChangeAspect="1"/>
+          </p:cNvPicPr>
+          <p:nvPr/>
+        </p:nvPicPr>
+        <p:blipFill>
+          <a:blip r:embed="rId2">
+            <a:extLst>
+              <a:ext uri="{28A0092B-C50C-407E-A947-70E740481C1C}">
+                <a14:useLocalDpi xmlns:a14="http://schemas.microsoft.com/office/drawing/2010/main" val="0"/>
+              </a:ext>
+            </a:extLst>
+          </a:blip>
+          <a:stretch>
+            <a:fillRect/>
+          </a:stretch>
+        </p:blipFill>
+        <p:spPr>
+          <a:xfrm>
+            <a:off x="4821224" y="1665513"/>
+            <a:ext cx="3695455" cy="4204607"/>
+          </a:xfrm>
+          <a:prstGeom prst="rect">
+            <a:avLst/>
+          </a:prstGeom>
+        </p:spPr>
+      </p:pic>
+      <p:sp>
+        <p:nvSpPr>
+          <p:cNvPr id="5" name="吹き出し: 角を丸めた四角形 4"/>
+          <p:cNvSpPr/>
+          <p:nvPr/>
+        </p:nvSpPr>
+        <p:spPr>
+          <a:xfrm>
+            <a:off x="8871096" y="850605"/>
+            <a:ext cx="2399413" cy="1290083"/>
+          </a:xfrm>
+          <a:prstGeom prst="wedgeRoundRectCallout">
+            <a:avLst>
+              <a:gd name="adj1" fmla="val -164187"/>
+              <a:gd name="adj2" fmla="val 72388"/>
+              <a:gd name="adj3" fmla="val 16667"/>
+            </a:avLst>
+          </a:prstGeom>
+        </p:spPr>
+        <p:style>
+          <a:lnRef idx="0">
+            <a:schemeClr val="accent1"/>
+          </a:lnRef>
+          <a:fillRef idx="3">
+            <a:schemeClr val="accent1"/>
+          </a:fillRef>
+          <a:effectRef idx="3">
+            <a:schemeClr val="accent1"/>
+          </a:effectRef>
+          <a:fontRef idx="minor">
+            <a:schemeClr val="lt1"/>
+          </a:fontRef>
+        </p:style>
+        <p:txBody>
+          <a:bodyPr rtlCol="0" anchor="ctr"/>
+          <a:lstStyle/>
+          <a:p>
+            <a:pPr algn="ctr"/>
+            <a:r>
+              <a:rPr kumimoji="1" lang="ja-JP" altLang="en-US" sz="2000" dirty="0">
+                <a:solidFill>
+                  <a:schemeClr val="tx1"/>
+                </a:solidFill>
+                <a:latin typeface="ＤＦＰ麗雅宋" panose="02020900000000000000" pitchFamily="18" charset="-128"/>
+                <a:ea typeface="ＤＦＰ麗雅宋" panose="02020900000000000000" pitchFamily="18" charset="-128"/>
+              </a:rPr>
+              <a:t>石よりも堅い頭で部下の意見にまったく耳を貸さない</a:t>
+            </a:r>
+          </a:p>
+        </p:txBody>
+      </p:sp>
+      <p:sp>
+        <p:nvSpPr>
+          <p:cNvPr id="6" name="スクロール: 横 5"/>
+          <p:cNvSpPr/>
+          <p:nvPr/>
+        </p:nvSpPr>
+        <p:spPr>
+          <a:xfrm>
+            <a:off x="5061098" y="5870120"/>
+            <a:ext cx="2091070" cy="680484"/>
+          </a:xfrm>
+          <a:prstGeom prst="horizontalScroll">
+            <a:avLst/>
+          </a:prstGeom>
+        </p:spPr>
+        <p:style>
+          <a:lnRef idx="2">
+            <a:schemeClr val="accent1">
+              <a:shade val="50000"/>
+            </a:schemeClr>
+          </a:lnRef>
+          <a:fillRef idx="1">
+            <a:schemeClr val="accent1"/>
+          </a:fillRef>
+          <a:effectRef idx="0">
+            <a:schemeClr val="accent1"/>
+          </a:effectRef>
+          <a:fontRef idx="minor">
+            <a:schemeClr val="lt1"/>
+          </a:fontRef>
+        </p:style>
+        <p:txBody>
+          <a:bodyPr rtlCol="0" anchor="ctr"/>
+          <a:lstStyle/>
+          <a:p>
+            <a:pPr algn="ctr"/>
+            <a:r>
+              <a:rPr kumimoji="1" lang="ja-JP" altLang="en-US" sz="2400" dirty="0">
+                <a:solidFill>
+                  <a:schemeClr val="tx1"/>
+                </a:solidFill>
+                <a:effectLst>
+                  <a:outerShdw blurRad="50800" dist="38100" dir="2700000" algn="tl" rotWithShape="0">
+                    <a:prstClr val="black">
+                      <a:alpha val="40000"/>
+                    </a:prstClr>
+                  </a:outerShdw>
+                </a:effectLst>
+                <a:latin typeface="ＤＦＰ麗雅宋" panose="02020900000000000000" pitchFamily="18" charset="-128"/>
+                <a:ea typeface="ＤＦＰ麗雅宋" panose="02020900000000000000" pitchFamily="18" charset="-128"/>
+              </a:rPr>
+              <a:t>歴戦の勇士</a:t>
+            </a:r>
+          </a:p>
+        </p:txBody>
+      </p:sp>
+      <p:sp>
+        <p:nvSpPr>
+          <p:cNvPr id="7" name="吹き出し: 角を丸めた四角形 6"/>
+          <p:cNvSpPr/>
+          <p:nvPr/>
+        </p:nvSpPr>
+        <p:spPr>
+          <a:xfrm>
+            <a:off x="8759455" y="3767816"/>
+            <a:ext cx="2642440" cy="1597005"/>
+          </a:xfrm>
+          <a:prstGeom prst="wedgeRoundRectCallout">
+            <a:avLst>
+              <a:gd name="adj1" fmla="val -84663"/>
+              <a:gd name="adj2" fmla="val -44908"/>
+              <a:gd name="adj3" fmla="val 16667"/>
+            </a:avLst>
+          </a:prstGeom>
+        </p:spPr>
+        <p:style>
+          <a:lnRef idx="0">
+            <a:schemeClr val="accent1"/>
+          </a:lnRef>
+          <a:fillRef idx="3">
+            <a:schemeClr val="accent1"/>
+          </a:fillRef>
+          <a:effectRef idx="3">
+            <a:schemeClr val="accent1"/>
+          </a:effectRef>
+          <a:fontRef idx="minor">
+            <a:schemeClr val="lt1"/>
+          </a:fontRef>
+        </p:style>
+        <p:txBody>
+          <a:bodyPr rtlCol="0" anchor="ctr"/>
+          <a:lstStyle/>
+          <a:p>
+            <a:pPr algn="ctr"/>
+            <a:r>
+              <a:rPr kumimoji="1" lang="ja-JP" altLang="en-US" sz="2000" dirty="0">
+                <a:solidFill>
+                  <a:schemeClr val="tx1"/>
+                </a:solidFill>
+                <a:latin typeface="ＤＦＰ麗雅宋" panose="02020900000000000000" pitchFamily="18" charset="-128"/>
+                <a:ea typeface="ＤＦＰ麗雅宋" panose="02020900000000000000" pitchFamily="18" charset="-128"/>
+              </a:rPr>
+              <a:t>スカイツリーよりも高いプライドで、何でも切れる剣を持っていると信じている。</a:t>
+            </a:r>
+          </a:p>
+        </p:txBody>
+      </p:sp>
+      <p:sp>
+        <p:nvSpPr>
+          <p:cNvPr id="8" name="吹き出し: 角を丸めた四角形 7"/>
+          <p:cNvSpPr/>
+          <p:nvPr/>
+        </p:nvSpPr>
+        <p:spPr>
+          <a:xfrm>
+            <a:off x="1332046" y="4175051"/>
+            <a:ext cx="2716557" cy="1536025"/>
+          </a:xfrm>
+          <a:prstGeom prst="wedgeRoundRectCallout">
+            <a:avLst>
+              <a:gd name="adj1" fmla="val 96579"/>
+              <a:gd name="adj2" fmla="val -8899"/>
+              <a:gd name="adj3" fmla="val 16667"/>
+            </a:avLst>
+          </a:prstGeom>
+        </p:spPr>
+        <p:style>
+          <a:lnRef idx="0">
+            <a:schemeClr val="accent1"/>
+          </a:lnRef>
+          <a:fillRef idx="3">
+            <a:schemeClr val="accent1"/>
+          </a:fillRef>
+          <a:effectRef idx="3">
+            <a:schemeClr val="accent1"/>
+          </a:effectRef>
+          <a:fontRef idx="minor">
+            <a:schemeClr val="lt1"/>
+          </a:fontRef>
+        </p:style>
+        <p:txBody>
+          <a:bodyPr rtlCol="0" anchor="ctr"/>
+          <a:lstStyle/>
+          <a:p>
+            <a:pPr algn="ctr"/>
+            <a:r>
+              <a:rPr kumimoji="1" lang="ja-JP" altLang="en-US" sz="2000" dirty="0">
+                <a:solidFill>
+                  <a:schemeClr val="tx1"/>
+                </a:solidFill>
+                <a:latin typeface="ＤＦＰ麗雅宋" panose="02020900000000000000" pitchFamily="18" charset="-128"/>
+                <a:ea typeface="ＤＦＰ麗雅宋" panose="02020900000000000000" pitchFamily="18" charset="-128"/>
+              </a:rPr>
+              <a:t>新しい技術を断固ブロック。いにしえの戦法を自分だけでなく部下にも強要する。</a:t>
+            </a:r>
+          </a:p>
+        </p:txBody>
+      </p:sp>
+      <p:sp>
+        <p:nvSpPr>
+          <p:cNvPr id="9" name="吹き出し: 角を丸めた四角形 8"/>
+          <p:cNvSpPr/>
+          <p:nvPr/>
+        </p:nvSpPr>
+        <p:spPr>
+          <a:xfrm>
+            <a:off x="1166745" y="1255334"/>
+            <a:ext cx="2826462" cy="1715386"/>
+          </a:xfrm>
+          <a:prstGeom prst="wedgeRoundRectCallout">
+            <a:avLst>
+              <a:gd name="adj1" fmla="val 125237"/>
+              <a:gd name="adj2" fmla="val 97245"/>
+              <a:gd name="adj3" fmla="val 16667"/>
+            </a:avLst>
+          </a:prstGeom>
+        </p:spPr>
+        <p:style>
+          <a:lnRef idx="0">
+            <a:schemeClr val="accent1"/>
+          </a:lnRef>
+          <a:fillRef idx="3">
+            <a:schemeClr val="accent1"/>
+          </a:fillRef>
+          <a:effectRef idx="3">
+            <a:schemeClr val="accent1"/>
+          </a:effectRef>
+          <a:fontRef idx="minor">
+            <a:schemeClr val="lt1"/>
+          </a:fontRef>
+        </p:style>
+        <p:txBody>
+          <a:bodyPr rtlCol="0" anchor="ctr"/>
+          <a:lstStyle/>
+          <a:p>
+            <a:pPr algn="ctr"/>
+            <a:r>
+              <a:rPr kumimoji="1" lang="ja-JP" altLang="en-US" sz="2000" dirty="0">
+                <a:solidFill>
+                  <a:schemeClr val="tx1"/>
+                </a:solidFill>
+                <a:latin typeface="ＤＦＰ麗雅宋" panose="02020900000000000000" pitchFamily="18" charset="-128"/>
+                <a:ea typeface="ＤＦＰ麗雅宋" panose="02020900000000000000" pitchFamily="18" charset="-128"/>
+              </a:rPr>
+              <a:t>過去の自分と部下を比較し、部下の努力を認めない。「俺の若いころは」とすぐに自慢話をする。</a:t>
+            </a:r>
+          </a:p>
+        </p:txBody>
+      </p:sp>
+      <p:sp>
+        <p:nvSpPr>
+          <p:cNvPr id="10" name="星: 24 pt 9"/>
+          <p:cNvSpPr/>
+          <p:nvPr/>
+        </p:nvSpPr>
+        <p:spPr>
+          <a:xfrm>
+            <a:off x="8676166" y="2013098"/>
+            <a:ext cx="2594344" cy="914400"/>
+          </a:xfrm>
+          <a:prstGeom prst="star24">
+            <a:avLst/>
+          </a:prstGeom>
+          <a:solidFill>
+            <a:srgbClr val="FF0000"/>
+          </a:solidFill>
+          <a:ln>
+            <a:solidFill>
+              <a:srgbClr val="FFFF00"/>
+            </a:solidFill>
+          </a:ln>
+        </p:spPr>
+        <p:style>
+          <a:lnRef idx="2">
+            <a:schemeClr val="accent1">
+              <a:shade val="50000"/>
+            </a:schemeClr>
+          </a:lnRef>
+          <a:fillRef idx="1">
+            <a:schemeClr val="accent1"/>
+          </a:fillRef>
+          <a:effectRef idx="0">
+            <a:schemeClr val="accent1"/>
+          </a:effectRef>
+          <a:fontRef idx="minor">
+            <a:schemeClr val="lt1"/>
+          </a:fontRef>
+        </p:style>
+        <p:txBody>
+          <a:bodyPr rtlCol="0" anchor="ctr"/>
+          <a:lstStyle/>
+          <a:p>
+            <a:pPr algn="ctr"/>
+            <a:r>
+              <a:rPr kumimoji="1" lang="ja-JP" altLang="en-US" dirty="0">
+                <a:latin typeface="ＤＦ綜藝体W7" panose="040B0709000000000000" pitchFamily="49" charset="-128"/>
+                <a:ea typeface="ＤＦ綜藝体W7" panose="040B0709000000000000" pitchFamily="49" charset="-128"/>
+              </a:rPr>
+              <a:t>思考の硬直</a:t>
+            </a:r>
+          </a:p>
+        </p:txBody>
+      </p:sp>
+      <p:sp>
+        <p:nvSpPr>
+          <p:cNvPr id="11" name="星: 24 pt 10"/>
+          <p:cNvSpPr/>
+          <p:nvPr/>
+        </p:nvSpPr>
+        <p:spPr>
+          <a:xfrm>
+            <a:off x="8034104" y="5253876"/>
+            <a:ext cx="3878468" cy="914400"/>
+          </a:xfrm>
+          <a:prstGeom prst="star24">
+            <a:avLst/>
+          </a:prstGeom>
+          <a:solidFill>
+            <a:srgbClr val="FF0000"/>
+          </a:solidFill>
+          <a:ln>
+            <a:solidFill>
+              <a:srgbClr val="FFFF00"/>
+            </a:solidFill>
+          </a:ln>
+        </p:spPr>
+        <p:style>
+          <a:lnRef idx="2">
+            <a:schemeClr val="accent1">
+              <a:shade val="50000"/>
+            </a:schemeClr>
+          </a:lnRef>
+          <a:fillRef idx="1">
+            <a:schemeClr val="accent1"/>
+          </a:fillRef>
+          <a:effectRef idx="0">
+            <a:schemeClr val="accent1"/>
+          </a:effectRef>
+          <a:fontRef idx="minor">
+            <a:schemeClr val="lt1"/>
+          </a:fontRef>
+        </p:style>
+        <p:txBody>
+          <a:bodyPr rtlCol="0" anchor="ctr"/>
+          <a:lstStyle/>
+          <a:p>
+            <a:pPr algn="ctr"/>
+            <a:r>
+              <a:rPr kumimoji="1" lang="ja-JP" altLang="en-US" dirty="0">
+                <a:latin typeface="ＤＦ綜藝体W7" panose="040B0709000000000000" pitchFamily="49" charset="-128"/>
+                <a:ea typeface="ＤＦ綜藝体W7" panose="040B0709000000000000" pitchFamily="49" charset="-128"/>
+              </a:rPr>
+              <a:t>高すぎるプライド</a:t>
+            </a:r>
+          </a:p>
+        </p:txBody>
+      </p:sp>
+      <p:sp>
+        <p:nvSpPr>
+          <p:cNvPr id="12" name="星: 24 pt 11"/>
+          <p:cNvSpPr/>
+          <p:nvPr/>
+        </p:nvSpPr>
+        <p:spPr>
+          <a:xfrm>
+            <a:off x="581057" y="5636204"/>
+            <a:ext cx="3885750" cy="914400"/>
+          </a:xfrm>
+          <a:prstGeom prst="star24">
+            <a:avLst/>
+          </a:prstGeom>
+          <a:solidFill>
+            <a:srgbClr val="FF0000"/>
+          </a:solidFill>
+          <a:ln>
+            <a:solidFill>
+              <a:srgbClr val="FFFF00"/>
+            </a:solidFill>
+          </a:ln>
+        </p:spPr>
+        <p:style>
+          <a:lnRef idx="2">
+            <a:schemeClr val="accent1">
+              <a:shade val="50000"/>
+            </a:schemeClr>
+          </a:lnRef>
+          <a:fillRef idx="1">
+            <a:schemeClr val="accent1"/>
+          </a:fillRef>
+          <a:effectRef idx="0">
+            <a:schemeClr val="accent1"/>
+          </a:effectRef>
+          <a:fontRef idx="minor">
+            <a:schemeClr val="lt1"/>
+          </a:fontRef>
+        </p:style>
+        <p:txBody>
+          <a:bodyPr rtlCol="0" anchor="ctr"/>
+          <a:lstStyle/>
+          <a:p>
+            <a:pPr algn="ctr"/>
+            <a:r>
+              <a:rPr kumimoji="1" lang="ja-JP" altLang="en-US" dirty="0">
+                <a:latin typeface="ＤＦ綜藝体W7" panose="040B0709000000000000" pitchFamily="49" charset="-128"/>
+                <a:ea typeface="ＤＦ綜藝体W7" panose="040B0709000000000000" pitchFamily="49" charset="-128"/>
+              </a:rPr>
+              <a:t>強すぎるこだわり</a:t>
+            </a:r>
+          </a:p>
+        </p:txBody>
+      </p:sp>
+      <p:sp>
+        <p:nvSpPr>
+          <p:cNvPr id="13" name="星: 24 pt 12"/>
+          <p:cNvSpPr/>
+          <p:nvPr/>
+        </p:nvSpPr>
+        <p:spPr>
+          <a:xfrm>
+            <a:off x="1099345" y="2853416"/>
+            <a:ext cx="2961263" cy="914400"/>
+          </a:xfrm>
+          <a:prstGeom prst="star24">
+            <a:avLst/>
+          </a:prstGeom>
+          <a:solidFill>
+            <a:srgbClr val="FF0000"/>
+          </a:solidFill>
+          <a:ln>
+            <a:solidFill>
+              <a:srgbClr val="FFFF00"/>
+            </a:solidFill>
+          </a:ln>
+        </p:spPr>
+        <p:style>
+          <a:lnRef idx="2">
+            <a:schemeClr val="accent1">
+              <a:shade val="50000"/>
+            </a:schemeClr>
+          </a:lnRef>
+          <a:fillRef idx="1">
+            <a:schemeClr val="accent1"/>
+          </a:fillRef>
+          <a:effectRef idx="0">
+            <a:schemeClr val="accent1"/>
+          </a:effectRef>
+          <a:fontRef idx="minor">
+            <a:schemeClr val="lt1"/>
+          </a:fontRef>
+        </p:style>
+        <p:txBody>
+          <a:bodyPr rtlCol="0" anchor="ctr"/>
+          <a:lstStyle/>
+          <a:p>
+            <a:pPr algn="ctr"/>
+            <a:r>
+              <a:rPr kumimoji="1" lang="ja-JP" altLang="en-US" dirty="0">
+                <a:latin typeface="ＤＦ綜藝体W7" panose="040B0709000000000000" pitchFamily="49" charset="-128"/>
+                <a:ea typeface="ＤＦ綜藝体W7" panose="040B0709000000000000" pitchFamily="49" charset="-128"/>
+              </a:rPr>
+              <a:t>上から目線</a:t>
+            </a:r>
           </a:p>
         </p:txBody>
       </p:sp>
     </p:spTree>
     <p:extLst>
       <p:ext uri="{BB962C8B-B14F-4D97-AF65-F5344CB8AC3E}">
-        <p14:creationId xmlns:p14="http://schemas.microsoft.com/office/powerpoint/2010/main" val="901569726"/>
+        <p14:creationId xmlns:p14="http://schemas.microsoft.com/office/powerpoint/2010/main" val="4111966913"/>
       </p:ext>
     </p:extLst>
   </p:cSld>
   <p:clrMapOvr>
     <a:masterClrMapping/>
   </p:clrMapOvr>
+  <p:timing>
+    <p:tnLst>
+      <p:par>
+        <p:cTn id="1" dur="indefinite" restart="never" nodeType="tmRoot">
+          <p:childTnLst>
+            <p:seq concurrent="1" nextAc="seek">
+              <p:cTn id="2" dur="indefinite" nodeType="mainSeq">
+                <p:childTnLst>
+                  <p:par>
+                    <p:cTn id="3" fill="hold">
+                      <p:stCondLst>
+                        <p:cond delay="indefinite"/>
+                      </p:stCondLst>
+                      <p:childTnLst>
+                        <p:par>
+                          <p:cTn id="4" fill="hold">
+                            <p:stCondLst>
+                              <p:cond delay="0"/>
+                            </p:stCondLst>
+                            <p:childTnLst>
+                              <p:par>
+                                <p:cTn id="5" presetID="42" presetClass="entr" presetSubtype="0" fill="hold" grpId="0" nodeType="clickEffect">
+                                  <p:stCondLst>
+                                    <p:cond delay="0"/>
+                                  </p:stCondLst>
+                                  <p:childTnLst>
+                                    <p:set>
+                                      <p:cBhvr>
+                                        <p:cTn id="6" dur="1" fill="hold">
+                                          <p:stCondLst>
+                                            <p:cond delay="0"/>
+                                          </p:stCondLst>
+                                        </p:cTn>
+                                        <p:tgtEl>
+                                          <p:spTgt spid="13"/>
+                                        </p:tgtEl>
+                                        <p:attrNameLst>
+                                          <p:attrName>style.visibility</p:attrName>
+                                        </p:attrNameLst>
+                                      </p:cBhvr>
+                                      <p:to>
+                                        <p:strVal val="visible"/>
+                                      </p:to>
+                                    </p:set>
+                                    <p:animEffect transition="in" filter="fade">
+                                      <p:cBhvr>
+                                        <p:cTn id="7" dur="1000"/>
+                                        <p:tgtEl>
+                                          <p:spTgt spid="13"/>
+                                        </p:tgtEl>
+                                      </p:cBhvr>
+                                    </p:animEffect>
+                                    <p:anim calcmode="lin" valueType="num">
+                                      <p:cBhvr>
+                                        <p:cTn id="8" dur="1000" fill="hold"/>
+                                        <p:tgtEl>
+                                          <p:spTgt spid="13"/>
+                                        </p:tgtEl>
+                                        <p:attrNameLst>
+                                          <p:attrName>ppt_x</p:attrName>
+                                        </p:attrNameLst>
+                                      </p:cBhvr>
+                                      <p:tavLst>
+                                        <p:tav tm="0">
+                                          <p:val>
+                                            <p:strVal val="#ppt_x"/>
+                                          </p:val>
+                                        </p:tav>
+                                        <p:tav tm="100000">
+                                          <p:val>
+                                            <p:strVal val="#ppt_x"/>
+                                          </p:val>
+                                        </p:tav>
+                                      </p:tavLst>
+                                    </p:anim>
+                                    <p:anim calcmode="lin" valueType="num">
+                                      <p:cBhvr>
+                                        <p:cTn id="9" dur="1000" fill="hold"/>
+                                        <p:tgtEl>
+                                          <p:spTgt spid="13"/>
+                                        </p:tgtEl>
+                                        <p:attrNameLst>
+                                          <p:attrName>ppt_y</p:attrName>
+                                        </p:attrNameLst>
+                                      </p:cBhvr>
+                                      <p:tavLst>
+                                        <p:tav tm="0">
+                                          <p:val>
+                                            <p:strVal val="#ppt_y+.1"/>
+                                          </p:val>
+                                        </p:tav>
+                                        <p:tav tm="100000">
+                                          <p:val>
+                                            <p:strVal val="#ppt_y"/>
+                                          </p:val>
+                                        </p:tav>
+                                      </p:tavLst>
+                                    </p:anim>
+                                  </p:childTnLst>
+                                </p:cTn>
+                              </p:par>
+                              <p:par>
+                                <p:cTn id="10" presetID="42" presetClass="entr" presetSubtype="0" fill="hold" grpId="0" nodeType="withEffect">
+                                  <p:stCondLst>
+                                    <p:cond delay="0"/>
+                                  </p:stCondLst>
+                                  <p:childTnLst>
+                                    <p:set>
+                                      <p:cBhvr>
+                                        <p:cTn id="11" dur="1" fill="hold">
+                                          <p:stCondLst>
+                                            <p:cond delay="0"/>
+                                          </p:stCondLst>
+                                        </p:cTn>
+                                        <p:tgtEl>
+                                          <p:spTgt spid="12"/>
+                                        </p:tgtEl>
+                                        <p:attrNameLst>
+                                          <p:attrName>style.visibility</p:attrName>
+                                        </p:attrNameLst>
+                                      </p:cBhvr>
+                                      <p:to>
+                                        <p:strVal val="visible"/>
+                                      </p:to>
+                                    </p:set>
+                                    <p:animEffect transition="in" filter="fade">
+                                      <p:cBhvr>
+                                        <p:cTn id="12" dur="1000"/>
+                                        <p:tgtEl>
+                                          <p:spTgt spid="12"/>
+                                        </p:tgtEl>
+                                      </p:cBhvr>
+                                    </p:animEffect>
+                                    <p:anim calcmode="lin" valueType="num">
+                                      <p:cBhvr>
+                                        <p:cTn id="13" dur="1000" fill="hold"/>
+                                        <p:tgtEl>
+                                          <p:spTgt spid="12"/>
+                                        </p:tgtEl>
+                                        <p:attrNameLst>
+                                          <p:attrName>ppt_x</p:attrName>
+                                        </p:attrNameLst>
+                                      </p:cBhvr>
+                                      <p:tavLst>
+                                        <p:tav tm="0">
+                                          <p:val>
+                                            <p:strVal val="#ppt_x"/>
+                                          </p:val>
+                                        </p:tav>
+                                        <p:tav tm="100000">
+                                          <p:val>
+                                            <p:strVal val="#ppt_x"/>
+                                          </p:val>
+                                        </p:tav>
+                                      </p:tavLst>
+                                    </p:anim>
+                                    <p:anim calcmode="lin" valueType="num">
+                                      <p:cBhvr>
+                                        <p:cTn id="14" dur="1000" fill="hold"/>
+                                        <p:tgtEl>
+                                          <p:spTgt spid="12"/>
+                                        </p:tgtEl>
+                                        <p:attrNameLst>
+                                          <p:attrName>ppt_y</p:attrName>
+                                        </p:attrNameLst>
+                                      </p:cBhvr>
+                                      <p:tavLst>
+                                        <p:tav tm="0">
+                                          <p:val>
+                                            <p:strVal val="#ppt_y+.1"/>
+                                          </p:val>
+                                        </p:tav>
+                                        <p:tav tm="100000">
+                                          <p:val>
+                                            <p:strVal val="#ppt_y"/>
+                                          </p:val>
+                                        </p:tav>
+                                      </p:tavLst>
+                                    </p:anim>
+                                  </p:childTnLst>
+                                </p:cTn>
+                              </p:par>
+                              <p:par>
+                                <p:cTn id="15" presetID="42" presetClass="entr" presetSubtype="0" fill="hold" grpId="0" nodeType="withEffect">
+                                  <p:stCondLst>
+                                    <p:cond delay="0"/>
+                                  </p:stCondLst>
+                                  <p:childTnLst>
+                                    <p:set>
+                                      <p:cBhvr>
+                                        <p:cTn id="16" dur="1" fill="hold">
+                                          <p:stCondLst>
+                                            <p:cond delay="0"/>
+                                          </p:stCondLst>
+                                        </p:cTn>
+                                        <p:tgtEl>
+                                          <p:spTgt spid="11"/>
+                                        </p:tgtEl>
+                                        <p:attrNameLst>
+                                          <p:attrName>style.visibility</p:attrName>
+                                        </p:attrNameLst>
+                                      </p:cBhvr>
+                                      <p:to>
+                                        <p:strVal val="visible"/>
+                                      </p:to>
+                                    </p:set>
+                                    <p:animEffect transition="in" filter="fade">
+                                      <p:cBhvr>
+                                        <p:cTn id="17" dur="1000"/>
+                                        <p:tgtEl>
+                                          <p:spTgt spid="11"/>
+                                        </p:tgtEl>
+                                      </p:cBhvr>
+                                    </p:animEffect>
+                                    <p:anim calcmode="lin" valueType="num">
+                                      <p:cBhvr>
+                                        <p:cTn id="18" dur="1000" fill="hold"/>
+                                        <p:tgtEl>
+                                          <p:spTgt spid="11"/>
+                                        </p:tgtEl>
+                                        <p:attrNameLst>
+                                          <p:attrName>ppt_x</p:attrName>
+                                        </p:attrNameLst>
+                                      </p:cBhvr>
+                                      <p:tavLst>
+                                        <p:tav tm="0">
+                                          <p:val>
+                                            <p:strVal val="#ppt_x"/>
+                                          </p:val>
+                                        </p:tav>
+                                        <p:tav tm="100000">
+                                          <p:val>
+                                            <p:strVal val="#ppt_x"/>
+                                          </p:val>
+                                        </p:tav>
+                                      </p:tavLst>
+                                    </p:anim>
+                                    <p:anim calcmode="lin" valueType="num">
+                                      <p:cBhvr>
+                                        <p:cTn id="19" dur="1000" fill="hold"/>
+                                        <p:tgtEl>
+                                          <p:spTgt spid="11"/>
+                                        </p:tgtEl>
+                                        <p:attrNameLst>
+                                          <p:attrName>ppt_y</p:attrName>
+                                        </p:attrNameLst>
+                                      </p:cBhvr>
+                                      <p:tavLst>
+                                        <p:tav tm="0">
+                                          <p:val>
+                                            <p:strVal val="#ppt_y+.1"/>
+                                          </p:val>
+                                        </p:tav>
+                                        <p:tav tm="100000">
+                                          <p:val>
+                                            <p:strVal val="#ppt_y"/>
+                                          </p:val>
+                                        </p:tav>
+                                      </p:tavLst>
+                                    </p:anim>
+                                  </p:childTnLst>
+                                </p:cTn>
+                              </p:par>
+                              <p:par>
+                                <p:cTn id="20" presetID="42" presetClass="entr" presetSubtype="0" fill="hold" grpId="0" nodeType="withEffect">
+                                  <p:stCondLst>
+                                    <p:cond delay="0"/>
+                                  </p:stCondLst>
+                                  <p:childTnLst>
+                                    <p:set>
+                                      <p:cBhvr>
+                                        <p:cTn id="21" dur="1" fill="hold">
+                                          <p:stCondLst>
+                                            <p:cond delay="0"/>
+                                          </p:stCondLst>
+                                        </p:cTn>
+                                        <p:tgtEl>
+                                          <p:spTgt spid="10"/>
+                                        </p:tgtEl>
+                                        <p:attrNameLst>
+                                          <p:attrName>style.visibility</p:attrName>
+                                        </p:attrNameLst>
+                                      </p:cBhvr>
+                                      <p:to>
+                                        <p:strVal val="visible"/>
+                                      </p:to>
+                                    </p:set>
+                                    <p:animEffect transition="in" filter="fade">
+                                      <p:cBhvr>
+                                        <p:cTn id="22" dur="1000"/>
+                                        <p:tgtEl>
+                                          <p:spTgt spid="10"/>
+                                        </p:tgtEl>
+                                      </p:cBhvr>
+                                    </p:animEffect>
+                                    <p:anim calcmode="lin" valueType="num">
+                                      <p:cBhvr>
+                                        <p:cTn id="23" dur="1000" fill="hold"/>
+                                        <p:tgtEl>
+                                          <p:spTgt spid="10"/>
+                                        </p:tgtEl>
+                                        <p:attrNameLst>
+                                          <p:attrName>ppt_x</p:attrName>
+                                        </p:attrNameLst>
+                                      </p:cBhvr>
+                                      <p:tavLst>
+                                        <p:tav tm="0">
+                                          <p:val>
+                                            <p:strVal val="#ppt_x"/>
+                                          </p:val>
+                                        </p:tav>
+                                        <p:tav tm="100000">
+                                          <p:val>
+                                            <p:strVal val="#ppt_x"/>
+                                          </p:val>
+                                        </p:tav>
+                                      </p:tavLst>
+                                    </p:anim>
+                                    <p:anim calcmode="lin" valueType="num">
+                                      <p:cBhvr>
+                                        <p:cTn id="24" dur="1000" fill="hold"/>
+                                        <p:tgtEl>
+                                          <p:spTgt spid="10"/>
+                                        </p:tgtEl>
+                                        <p:attrNameLst>
+                                          <p:attrName>ppt_y</p:attrName>
+                                        </p:attrNameLst>
+                                      </p:cBhvr>
+                                      <p:tavLst>
+                                        <p:tav tm="0">
+                                          <p:val>
+                                            <p:strVal val="#ppt_y+.1"/>
+                                          </p:val>
+                                        </p:tav>
+                                        <p:tav tm="100000">
+                                          <p:val>
+                                            <p:strVal val="#ppt_y"/>
+                                          </p:val>
+                                        </p:tav>
+                                      </p:tavLst>
+                                    </p:anim>
+                                  </p:childTnLst>
+                                </p:cTn>
+                              </p:par>
+                            </p:childTnLst>
+                          </p:cTn>
+                        </p:par>
+                      </p:childTnLst>
+                    </p:cTn>
+                  </p:par>
+                </p:childTnLst>
+              </p:cTn>
+              <p:prevCondLst>
+                <p:cond evt="onPrev" delay="0">
+                  <p:tgtEl>
+                    <p:sldTgt/>
+                  </p:tgtEl>
+                </p:cond>
+              </p:prevCondLst>
+              <p:nextCondLst>
+                <p:cond evt="onNext" delay="0">
+                  <p:tgtEl>
+                    <p:sldTgt/>
+                  </p:tgtEl>
+                </p:cond>
+              </p:nextCondLst>
+            </p:seq>
+          </p:childTnLst>
+        </p:cTn>
+      </p:par>
+    </p:tnLst>
+    <p:bldLst>
+      <p:bldP spid="10" grpId="0" animBg="1"/>
+      <p:bldP spid="11" grpId="0" animBg="1"/>
+      <p:bldP spid="12" grpId="0" animBg="1"/>
+      <p:bldP spid="13" grpId="0" animBg="1"/>
+    </p:bldLst>
+  </p:timing>
 </p:sld>
 </file>
 
@@ -8236,13 +9641,7 @@
       </p:grpSpPr>
       <p:sp>
         <p:nvSpPr>
-          <p:cNvPr id="2" name="タイトル 1">
-            <a:extLst>
-              <a:ext uri="{FF2B5EF4-FFF2-40B4-BE49-F238E27FC236}">
-                <a16:creationId xmlns:a16="http://schemas.microsoft.com/office/drawing/2014/main" xmlns="" id="{9A6E1FF1-5E4C-44E7-BC2B-114412F8541A}"/>
-              </a:ext>
-            </a:extLst>
-          </p:cNvPr>
+          <p:cNvPr id="2" name="タイトル 1"/>
           <p:cNvSpPr>
             <a:spLocks noGrp="1"/>
           </p:cNvSpPr>
@@ -8250,126 +9649,105 @@
             <p:ph type="title"/>
           </p:nvPr>
         </p:nvSpPr>
-        <p:spPr>
-          <a:xfrm>
-            <a:off x="1327878" y="1548245"/>
-            <a:ext cx="10178322" cy="1492132"/>
-          </a:xfrm>
-        </p:spPr>
+        <p:spPr/>
         <p:txBody>
           <a:bodyPr/>
           <a:lstStyle/>
           <a:p>
             <a:r>
               <a:rPr kumimoji="1" lang="ja-JP" altLang="en-US" dirty="0"/>
-              <a:t>ご清聴ありがとうございました。</a:t>
+              <a:t>諸悪の根源は、</a:t>
+            </a:r>
+            <a:r>
+              <a:rPr kumimoji="1" lang="ja-JP" altLang="en-US" dirty="0">
+                <a:solidFill>
+                  <a:srgbClr val="0070C0"/>
+                </a:solidFill>
+                <a:latin typeface="ＤＦ綜藝体W7" panose="040B0709000000000000" pitchFamily="49" charset="-128"/>
+                <a:ea typeface="ＤＦ綜藝体W7" panose="040B0709000000000000" pitchFamily="49" charset="-128"/>
+              </a:rPr>
+              <a:t>思考の硬直</a:t>
             </a:r>
           </a:p>
         </p:txBody>
       </p:sp>
       <p:sp>
         <p:nvSpPr>
-          <p:cNvPr id="4" name="テキスト ボックス 3">
-            <a:extLst>
-              <a:ext uri="{FF2B5EF4-FFF2-40B4-BE49-F238E27FC236}">
-                <a16:creationId xmlns:a16="http://schemas.microsoft.com/office/drawing/2014/main" xmlns="" id="{7B7F6390-C097-4AB8-A212-8F3FA3CBDBB3}"/>
-              </a:ext>
-            </a:extLst>
-          </p:cNvPr>
-          <p:cNvSpPr txBox="1"/>
-          <p:nvPr/>
-        </p:nvSpPr>
-        <p:spPr>
-          <a:xfrm>
-            <a:off x="3116580" y="3817624"/>
-            <a:ext cx="6316980" cy="923330"/>
-          </a:xfrm>
-          <a:prstGeom prst="rect">
-            <a:avLst/>
-          </a:prstGeom>
-          <a:noFill/>
-        </p:spPr>
+          <p:cNvPr id="3" name="コンテンツ プレースホルダー 2"/>
+          <p:cNvSpPr>
+            <a:spLocks noGrp="1"/>
+          </p:cNvSpPr>
+          <p:nvPr>
+            <p:ph idx="1"/>
+          </p:nvPr>
+        </p:nvSpPr>
+        <p:spPr/>
         <p:txBody>
-          <a:bodyPr wrap="square" rtlCol="0">
-            <a:spAutoFit/>
-          </a:bodyPr>
+          <a:bodyPr/>
           <a:lstStyle/>
           <a:p>
             <a:r>
-              <a:rPr kumimoji="1" lang="en-US" altLang="ja-JP" dirty="0"/>
-              <a:t>※</a:t>
-            </a:r>
-            <a:r>
               <a:rPr kumimoji="1" lang="ja-JP" altLang="en-US" dirty="0"/>
-              <a:t>このスライドの内容を実践して引き起こされた結果につきましては、当方は一切の責任を負いませんのであしからずご了承ください。</a:t>
-            </a:r>
-          </a:p>
-        </p:txBody>
-      </p:sp>
-      <p:sp>
-        <p:nvSpPr>
-          <p:cNvPr id="5" name="テキスト ボックス 4">
-            <a:extLst>
-              <a:ext uri="{FF2B5EF4-FFF2-40B4-BE49-F238E27FC236}">
-                <a16:creationId xmlns:a16="http://schemas.microsoft.com/office/drawing/2014/main" xmlns="" id="{98415D0E-45A0-4EEC-A142-DD333E5DEAF4}"/>
-              </a:ext>
-            </a:extLst>
-          </p:cNvPr>
-          <p:cNvSpPr txBox="1"/>
-          <p:nvPr/>
-        </p:nvSpPr>
-        <p:spPr>
-          <a:xfrm>
-            <a:off x="4708879" y="5577840"/>
-            <a:ext cx="3416320" cy="923330"/>
-          </a:xfrm>
-          <a:prstGeom prst="rect">
-            <a:avLst/>
-          </a:prstGeom>
-          <a:noFill/>
-        </p:spPr>
-        <p:txBody>
-          <a:bodyPr wrap="none" rtlCol="0">
-            <a:spAutoFit/>
-          </a:bodyPr>
-          <a:lstStyle/>
-          <a:p>
-            <a:pPr algn="ctr"/>
+              <a:t>年を重ねると、どうしても視野が狭くなります。</a:t>
+            </a:r>
+            <a:endParaRPr kumimoji="1" lang="en-US" altLang="ja-JP" dirty="0"/>
+          </a:p>
+          <a:p>
+            <a:pPr lvl="1"/>
             <a:r>
               <a:rPr kumimoji="1" lang="ja-JP" altLang="en-US" dirty="0"/>
-              <a:t>ソフトウエア研究会</a:t>
-            </a:r>
-            <a:r>
-              <a:rPr kumimoji="1" lang="en-US" altLang="ja-JP" dirty="0"/>
-              <a:t>in</a:t>
-            </a:r>
+              <a:t>思考パターンが「だろう」に傾向していき、大事な事を見落としてしまいます。</a:t>
+            </a:r>
+            <a:endParaRPr kumimoji="1" lang="en-US" altLang="ja-JP" dirty="0"/>
+          </a:p>
+          <a:p>
+            <a:r>
+              <a:rPr lang="ja-JP" altLang="en-US" dirty="0"/>
+              <a:t>豊富な知識と経験が、いつしか思考を硬直化させてしまいます</a:t>
+            </a:r>
+            <a:r>
+              <a:rPr lang="ja-JP" altLang="en-US" dirty="0" smtClean="0"/>
+              <a:t>。</a:t>
+            </a:r>
+            <a:endParaRPr lang="en-US" altLang="ja-JP" dirty="0" smtClean="0"/>
+          </a:p>
+          <a:p>
+            <a:pPr lvl="1"/>
+            <a:r>
+              <a:rPr lang="ja-JP" altLang="en-US" dirty="0" smtClean="0"/>
+              <a:t>自身の知識や経験を過信することなく、物事の判断や見極めを正確に行うことが大事です。</a:t>
+            </a:r>
+            <a:endParaRPr lang="en-US" altLang="ja-JP" dirty="0"/>
+          </a:p>
+          <a:p>
             <a:r>
               <a:rPr kumimoji="1" lang="ja-JP" altLang="en-US" dirty="0"/>
-              <a:t>秋葉原</a:t>
+              <a:t>ソフトウエアエンジニアにとって、古い知識や常識がまったく役に立たない事は珍しくありません。</a:t>
             </a:r>
             <a:endParaRPr kumimoji="1" lang="en-US" altLang="ja-JP" dirty="0"/>
           </a:p>
           <a:p>
-            <a:pPr algn="ctr"/>
-            <a:r>
-              <a:rPr kumimoji="1" lang="ja-JP" altLang="en-US" dirty="0"/>
-              <a:t>有限会社テクニカルアーツ代表</a:t>
-            </a:r>
-            <a:endParaRPr kumimoji="1" lang="en-US" altLang="ja-JP" dirty="0"/>
-          </a:p>
-          <a:p>
-            <a:pPr algn="ctr"/>
-            <a:r>
-              <a:rPr kumimoji="1" lang="ja-JP" altLang="en-US" dirty="0"/>
-              <a:t>池田公平</a:t>
-            </a:r>
+            <a:pPr lvl="1"/>
+            <a:r>
+              <a:rPr lang="en-US" altLang="ja-JP" dirty="0"/>
+              <a:t>3</a:t>
+            </a:r>
+            <a:r>
+              <a:rPr lang="ja-JP" altLang="en-US" dirty="0"/>
+              <a:t>年以上古い知識は、「まったく役に立たない」と考えて、つねに最新の情報でオーバーライド</a:t>
+            </a:r>
+            <a:r>
+              <a:rPr lang="ja-JP" altLang="en-US" dirty="0" smtClean="0"/>
+              <a:t>するよ心がけたいです。</a:t>
+            </a:r>
+            <a:endParaRPr kumimoji="1" lang="ja-JP" altLang="en-US" dirty="0"/>
           </a:p>
         </p:txBody>
       </p:sp>
     </p:spTree>
     <p:extLst>
       <p:ext uri="{BB962C8B-B14F-4D97-AF65-F5344CB8AC3E}">
-        <p14:creationId xmlns:p14="http://schemas.microsoft.com/office/powerpoint/2010/main" val="2234897559"/>
+        <p14:creationId xmlns:p14="http://schemas.microsoft.com/office/powerpoint/2010/main" val="1272095260"/>
       </p:ext>
     </p:extLst>
   </p:cSld>
@@ -8398,13 +9776,7 @@
       </p:grpSpPr>
       <p:sp>
         <p:nvSpPr>
-          <p:cNvPr id="2" name="タイトル 1">
-            <a:extLst>
-              <a:ext uri="{FF2B5EF4-FFF2-40B4-BE49-F238E27FC236}">
-                <a16:creationId xmlns:a16="http://schemas.microsoft.com/office/drawing/2014/main" xmlns="" id="{60453C65-5F4F-4304-A323-5424CE55402F}"/>
-              </a:ext>
-            </a:extLst>
-          </p:cNvPr>
+          <p:cNvPr id="2" name="タイトル 1"/>
           <p:cNvSpPr>
             <a:spLocks noGrp="1"/>
           </p:cNvSpPr>
@@ -8419,80 +9791,437 @@
           <a:p>
             <a:r>
               <a:rPr kumimoji="1" lang="ja-JP" altLang="en-US" dirty="0"/>
-              <a:t>次回予告</a:t>
-            </a:r>
-          </a:p>
-        </p:txBody>
-      </p:sp>
-      <p:sp>
-        <p:nvSpPr>
-          <p:cNvPr id="4" name="四角形: 角を丸くする 3">
-            <a:extLst>
-              <a:ext uri="{FF2B5EF4-FFF2-40B4-BE49-F238E27FC236}">
-                <a16:creationId xmlns:a16="http://schemas.microsoft.com/office/drawing/2014/main" xmlns="" id="{826EE748-8BBA-4128-A236-720D6FF7088B}"/>
-              </a:ext>
-            </a:extLst>
-          </p:cNvPr>
-          <p:cNvSpPr/>
-          <p:nvPr/>
-        </p:nvSpPr>
-        <p:spPr>
-          <a:xfrm>
-            <a:off x="3695700" y="2971800"/>
-            <a:ext cx="4800600" cy="914400"/>
-          </a:xfrm>
-          <a:prstGeom prst="roundRect">
-            <a:avLst/>
-          </a:prstGeom>
-        </p:spPr>
-        <p:style>
-          <a:lnRef idx="2">
-            <a:schemeClr val="accent1">
-              <a:shade val="50000"/>
-            </a:schemeClr>
-          </a:lnRef>
-          <a:fillRef idx="1">
-            <a:schemeClr val="accent1"/>
-          </a:fillRef>
-          <a:effectRef idx="0">
-            <a:schemeClr val="accent1"/>
-          </a:effectRef>
-          <a:fontRef idx="minor">
-            <a:schemeClr val="lt1"/>
-          </a:fontRef>
-        </p:style>
-        <p:txBody>
-          <a:bodyPr rtlCol="0" anchor="ctr"/>
-          <a:lstStyle/>
-          <a:p>
-            <a:pPr algn="ctr"/>
-            <a:r>
-              <a:rPr kumimoji="1" lang="en-US" altLang="ja-JP" sz="2800" dirty="0">
+              <a:t>役に立たないもの</a:t>
+            </a:r>
+            <a:r>
+              <a:rPr kumimoji="1" lang="ja-JP" altLang="en-US" b="1" cap="none" spc="0" dirty="0">
+                <a:ln w="9525">
+                  <a:solidFill>
+                    <a:schemeClr val="bg1"/>
+                  </a:solidFill>
+                  <a:prstDash val="solid"/>
+                </a:ln>
                 <a:solidFill>
                   <a:schemeClr val="tx1"/>
                 </a:solidFill>
-                <a:latin typeface="Berlin Sans FB Demi" panose="020E0802020502020306" pitchFamily="34" charset="0"/>
+                <a:effectLst>
+                  <a:outerShdw blurRad="12700" dist="38100" dir="2700000" algn="tl" rotWithShape="0">
+                    <a:schemeClr val="bg1">
+                      <a:lumMod val="50000"/>
+                    </a:schemeClr>
+                  </a:outerShdw>
+                </a:effectLst>
+                <a:latin typeface="ＤＦＰ麗雅宋" panose="02020900000000000000" pitchFamily="18" charset="-128"/>
+                <a:ea typeface="ＤＦＰ麗雅宋" panose="02020900000000000000" pitchFamily="18" charset="-128"/>
               </a:rPr>
-              <a:t>HAPPY-3</a:t>
-            </a:r>
-          </a:p>
-          <a:p>
-            <a:pPr algn="ctr"/>
-            <a:r>
-              <a:rPr kumimoji="1" lang="ja-JP" altLang="en-US" sz="2800" dirty="0">
+              <a:t>御三家</a:t>
+            </a:r>
+            <a:endParaRPr kumimoji="1" lang="ja-JP" altLang="en-US" dirty="0">
+              <a:latin typeface="ＤＦＰ麗雅宋" panose="02020900000000000000" pitchFamily="18" charset="-128"/>
+              <a:ea typeface="ＤＦＰ麗雅宋" panose="02020900000000000000" pitchFamily="18" charset="-128"/>
+            </a:endParaRPr>
+          </a:p>
+        </p:txBody>
+      </p:sp>
+      <p:sp>
+        <p:nvSpPr>
+          <p:cNvPr id="3" name="コンテンツ プレースホルダー 2"/>
+          <p:cNvSpPr>
+            <a:spLocks noGrp="1"/>
+          </p:cNvSpPr>
+          <p:nvPr>
+            <p:ph idx="1"/>
+          </p:nvPr>
+        </p:nvSpPr>
+        <p:spPr>
+          <a:xfrm>
+            <a:off x="3555406" y="2286001"/>
+            <a:ext cx="5241271" cy="3593591"/>
+          </a:xfrm>
+        </p:spPr>
+        <p:txBody>
+          <a:bodyPr>
+            <a:normAutofit/>
+            <a:scene3d>
+              <a:camera prst="orthographicFront"/>
+              <a:lightRig rig="soft" dir="t">
+                <a:rot lat="0" lon="0" rev="15600000"/>
+              </a:lightRig>
+            </a:scene3d>
+            <a:sp3d extrusionH="57150" prstMaterial="softEdge">
+              <a:bevelT w="25400" h="38100"/>
+            </a:sp3d>
+          </a:bodyPr>
+          <a:lstStyle/>
+          <a:p>
+            <a:pPr marL="457200" indent="-457200">
+              <a:buFont typeface="+mj-lt"/>
+              <a:buAutoNum type="arabicPeriod"/>
+            </a:pPr>
+            <a:r>
+              <a:rPr kumimoji="1" lang="ja-JP" altLang="en-US" sz="6600" b="1" dirty="0">
+                <a:ln>
+                  <a:solidFill>
+                    <a:schemeClr val="tx1"/>
+                  </a:solidFill>
+                </a:ln>
+                <a:solidFill>
+                  <a:srgbClr val="0070C0"/>
+                </a:solidFill>
+                <a:latin typeface="ＤＦ綜藝体W7" panose="040B0709000000000000" pitchFamily="49" charset="-128"/>
+                <a:ea typeface="ＤＦ綜藝体W7" panose="040B0709000000000000" pitchFamily="49" charset="-128"/>
+              </a:rPr>
+              <a:t>こだわり</a:t>
+            </a:r>
+            <a:endParaRPr kumimoji="1" lang="en-US" altLang="ja-JP" sz="6600" b="1" dirty="0">
+              <a:ln>
                 <a:solidFill>
                   <a:schemeClr val="tx1"/>
                 </a:solidFill>
+              </a:ln>
+              <a:solidFill>
+                <a:srgbClr val="0070C0"/>
+              </a:solidFill>
+              <a:latin typeface="ＤＦ綜藝体W7" panose="040B0709000000000000" pitchFamily="49" charset="-128"/>
+              <a:ea typeface="ＤＦ綜藝体W7" panose="040B0709000000000000" pitchFamily="49" charset="-128"/>
+            </a:endParaRPr>
+          </a:p>
+          <a:p>
+            <a:pPr marL="457200" indent="-457200">
+              <a:buFont typeface="+mj-lt"/>
+              <a:buAutoNum type="arabicPeriod"/>
+            </a:pPr>
+            <a:r>
+              <a:rPr lang="ja-JP" altLang="en-US" sz="6600" b="1" dirty="0">
+                <a:ln>
+                  <a:solidFill>
+                    <a:schemeClr val="tx1"/>
+                  </a:solidFill>
+                </a:ln>
+                <a:solidFill>
+                  <a:srgbClr val="0070C0"/>
+                </a:solidFill>
+                <a:latin typeface="ＤＦ綜藝体W7" panose="040B0709000000000000" pitchFamily="49" charset="-128"/>
+                <a:ea typeface="ＤＦ綜藝体W7" panose="040B0709000000000000" pitchFamily="49" charset="-128"/>
               </a:rPr>
-              <a:t>怒りからの解放</a:t>
-            </a:r>
+              <a:t>プライド</a:t>
+            </a:r>
+            <a:endParaRPr lang="en-US" altLang="ja-JP" sz="6600" b="1" dirty="0">
+              <a:ln>
+                <a:solidFill>
+                  <a:schemeClr val="tx1"/>
+                </a:solidFill>
+              </a:ln>
+              <a:solidFill>
+                <a:srgbClr val="0070C0"/>
+              </a:solidFill>
+              <a:latin typeface="ＤＦ綜藝体W7" panose="040B0709000000000000" pitchFamily="49" charset="-128"/>
+              <a:ea typeface="ＤＦ綜藝体W7" panose="040B0709000000000000" pitchFamily="49" charset="-128"/>
+            </a:endParaRPr>
+          </a:p>
+          <a:p>
+            <a:pPr marL="457200" indent="-457200">
+              <a:buFont typeface="+mj-lt"/>
+              <a:buAutoNum type="arabicPeriod"/>
+            </a:pPr>
+            <a:r>
+              <a:rPr lang="ja-JP" altLang="en-US" sz="6600" b="1" dirty="0">
+                <a:ln>
+                  <a:solidFill>
+                    <a:schemeClr val="tx1"/>
+                  </a:solidFill>
+                </a:ln>
+                <a:solidFill>
+                  <a:srgbClr val="0070C0"/>
+                </a:solidFill>
+                <a:latin typeface="ＤＦ綜藝体W7" panose="040B0709000000000000" pitchFamily="49" charset="-128"/>
+                <a:ea typeface="ＤＦ綜藝体W7" panose="040B0709000000000000" pitchFamily="49" charset="-128"/>
+              </a:rPr>
+              <a:t>古い知識</a:t>
+            </a:r>
+            <a:endParaRPr kumimoji="1" lang="ja-JP" altLang="en-US" sz="6600" b="1" dirty="0">
+              <a:ln>
+                <a:solidFill>
+                  <a:schemeClr val="tx1"/>
+                </a:solidFill>
+              </a:ln>
+              <a:solidFill>
+                <a:srgbClr val="0070C0"/>
+              </a:solidFill>
+              <a:latin typeface="ＤＦ綜藝体W7" panose="040B0709000000000000" pitchFamily="49" charset="-128"/>
+              <a:ea typeface="ＤＦ綜藝体W7" panose="040B0709000000000000" pitchFamily="49" charset="-128"/>
+            </a:endParaRPr>
           </a:p>
         </p:txBody>
       </p:sp>
     </p:spTree>
     <p:extLst>
       <p:ext uri="{BB962C8B-B14F-4D97-AF65-F5344CB8AC3E}">
-        <p14:creationId xmlns:p14="http://schemas.microsoft.com/office/powerpoint/2010/main" val="4146078265"/>
+        <p14:creationId xmlns:p14="http://schemas.microsoft.com/office/powerpoint/2010/main" val="2850708321"/>
+      </p:ext>
+    </p:extLst>
+  </p:cSld>
+  <p:clrMapOvr>
+    <a:masterClrMapping/>
+  </p:clrMapOvr>
+</p:sld>
+</file>
+
+<file path=ppt/slides/slide8.xml><?xml version="1.0" encoding="utf-8"?>
+<p:sld xmlns:a="http://schemas.openxmlformats.org/drawingml/2006/main" xmlns:r="http://schemas.openxmlformats.org/officeDocument/2006/relationships" xmlns:p="http://schemas.openxmlformats.org/presentationml/2006/main">
+  <p:cSld>
+    <p:spTree>
+      <p:nvGrpSpPr>
+        <p:cNvPr id="1" name=""/>
+        <p:cNvGrpSpPr/>
+        <p:nvPr/>
+      </p:nvGrpSpPr>
+      <p:grpSpPr>
+        <a:xfrm>
+          <a:off x="0" y="0"/>
+          <a:ext cx="0" cy="0"/>
+          <a:chOff x="0" y="0"/>
+          <a:chExt cx="0" cy="0"/>
+        </a:xfrm>
+      </p:grpSpPr>
+      <p:sp>
+        <p:nvSpPr>
+          <p:cNvPr id="2" name="タイトル 1"/>
+          <p:cNvSpPr>
+            <a:spLocks noGrp="1"/>
+          </p:cNvSpPr>
+          <p:nvPr>
+            <p:ph type="title"/>
+          </p:nvPr>
+        </p:nvSpPr>
+        <p:spPr/>
+        <p:txBody>
+          <a:bodyPr/>
+          <a:lstStyle/>
+          <a:p>
+            <a:r>
+              <a:rPr kumimoji="1" lang="ja-JP" altLang="en-US" dirty="0"/>
+              <a:t>鎧を脱ぎ捨てて</a:t>
+            </a:r>
+            <a:r>
+              <a:rPr kumimoji="1" lang="ja-JP" altLang="en-US" dirty="0">
+                <a:solidFill>
+                  <a:srgbClr val="FF0000"/>
+                </a:solidFill>
+                <a:latin typeface="ＤＦＰ麗雅宋" panose="02020900000000000000" pitchFamily="18" charset="-128"/>
+                <a:ea typeface="ＤＦＰ麗雅宋" panose="02020900000000000000" pitchFamily="18" charset="-128"/>
+              </a:rPr>
+              <a:t>身軽になろう</a:t>
+            </a:r>
+          </a:p>
+        </p:txBody>
+      </p:sp>
+      <p:sp>
+        <p:nvSpPr>
+          <p:cNvPr id="3" name="コンテンツ プレースホルダー 2"/>
+          <p:cNvSpPr>
+            <a:spLocks noGrp="1"/>
+          </p:cNvSpPr>
+          <p:nvPr>
+            <p:ph idx="1"/>
+          </p:nvPr>
+        </p:nvSpPr>
+        <p:spPr/>
+        <p:txBody>
+          <a:bodyPr>
+            <a:normAutofit fontScale="92500" lnSpcReduction="20000"/>
+          </a:bodyPr>
+          <a:lstStyle/>
+          <a:p>
+            <a:r>
+              <a:rPr kumimoji="1" lang="ja-JP" altLang="en-US" dirty="0" smtClean="0"/>
+              <a:t>「こだわり」「プライド」「古い知識」という鎧を脱ぎ捨てて、フレッシュで柔軟な思考を取り戻しましょう。</a:t>
+            </a:r>
+            <a:endParaRPr kumimoji="1" lang="en-US" altLang="ja-JP" dirty="0" smtClean="0"/>
+          </a:p>
+          <a:p>
+            <a:pPr lvl="1"/>
+            <a:r>
+              <a:rPr lang="ja-JP" altLang="en-US" dirty="0" smtClean="0"/>
+              <a:t>身軽な思考で若返りましょう</a:t>
+            </a:r>
+            <a:endParaRPr kumimoji="1" lang="en-US" altLang="ja-JP" dirty="0"/>
+          </a:p>
+          <a:p>
+            <a:r>
+              <a:rPr lang="ja-JP" altLang="en-US" dirty="0"/>
+              <a:t>年を取ったら、自分の思考や行動に</a:t>
+            </a:r>
+            <a:r>
+              <a:rPr lang="ja-JP" altLang="en-US" dirty="0" smtClean="0"/>
+              <a:t>対し「</a:t>
+            </a:r>
+            <a:r>
+              <a:rPr lang="ja-JP" altLang="en-US" dirty="0"/>
+              <a:t>これで本当に良いのか？」という疑問</a:t>
+            </a:r>
+            <a:r>
+              <a:rPr lang="ja-JP" altLang="en-US" dirty="0" smtClean="0"/>
+              <a:t>を常に投げかける</a:t>
+            </a:r>
+            <a:r>
+              <a:rPr lang="ja-JP" altLang="en-US" dirty="0"/>
+              <a:t>事が大事です</a:t>
+            </a:r>
+            <a:r>
+              <a:rPr lang="ja-JP" altLang="en-US" dirty="0" smtClean="0"/>
+              <a:t>。</a:t>
+            </a:r>
+            <a:endParaRPr lang="en-US" altLang="ja-JP" dirty="0" smtClean="0"/>
+          </a:p>
+          <a:p>
+            <a:pPr lvl="1"/>
+            <a:r>
+              <a:rPr lang="ja-JP" altLang="en-US" dirty="0" smtClean="0"/>
+              <a:t>自分を過信しないようにしましょう</a:t>
+            </a:r>
+            <a:endParaRPr lang="en-US" altLang="ja-JP" dirty="0"/>
+          </a:p>
+          <a:p>
+            <a:r>
+              <a:rPr kumimoji="1" lang="ja-JP" altLang="en-US" dirty="0"/>
+              <a:t>ソフトウエアエンジニアにとって、過去の栄光は何の役にも立たないと認識してください。せいぜい、人と知り合うキッカケになる程度です</a:t>
+            </a:r>
+            <a:r>
+              <a:rPr kumimoji="1" lang="ja-JP" altLang="en-US" dirty="0" smtClean="0"/>
+              <a:t>。</a:t>
+            </a:r>
+            <a:endParaRPr kumimoji="1" lang="en-US" altLang="ja-JP" dirty="0" smtClean="0"/>
+          </a:p>
+          <a:p>
+            <a:pPr lvl="1"/>
+            <a:r>
+              <a:rPr kumimoji="1" lang="ja-JP" altLang="en-US" dirty="0" smtClean="0"/>
+              <a:t>大事なのは過去ではなく現在と未来です。</a:t>
+            </a:r>
+            <a:endParaRPr kumimoji="1" lang="en-US" altLang="ja-JP" dirty="0"/>
+          </a:p>
+          <a:p>
+            <a:r>
+              <a:rPr lang="ja-JP" altLang="en-US" dirty="0"/>
+              <a:t>こだわりを捨て、新鮮な目線で物事を見つめ、人の言葉に常に耳を貸すこと。これが老害エンジニアから脱却する第一歩です。</a:t>
+            </a:r>
+            <a:endParaRPr kumimoji="1" lang="ja-JP" altLang="en-US" dirty="0"/>
+          </a:p>
+        </p:txBody>
+      </p:sp>
+    </p:spTree>
+    <p:extLst>
+      <p:ext uri="{BB962C8B-B14F-4D97-AF65-F5344CB8AC3E}">
+        <p14:creationId xmlns:p14="http://schemas.microsoft.com/office/powerpoint/2010/main" val="438359909"/>
+      </p:ext>
+    </p:extLst>
+  </p:cSld>
+  <p:clrMapOvr>
+    <a:masterClrMapping/>
+  </p:clrMapOvr>
+</p:sld>
+</file>
+
+<file path=ppt/slides/slide9.xml><?xml version="1.0" encoding="utf-8"?>
+<p:sld xmlns:a="http://schemas.openxmlformats.org/drawingml/2006/main" xmlns:r="http://schemas.openxmlformats.org/officeDocument/2006/relationships" xmlns:p="http://schemas.openxmlformats.org/presentationml/2006/main">
+  <p:cSld>
+    <p:spTree>
+      <p:nvGrpSpPr>
+        <p:cNvPr id="1" name=""/>
+        <p:cNvGrpSpPr/>
+        <p:nvPr/>
+      </p:nvGrpSpPr>
+      <p:grpSpPr>
+        <a:xfrm>
+          <a:off x="0" y="0"/>
+          <a:ext cx="0" cy="0"/>
+          <a:chOff x="0" y="0"/>
+          <a:chExt cx="0" cy="0"/>
+        </a:xfrm>
+      </p:grpSpPr>
+      <p:sp>
+        <p:nvSpPr>
+          <p:cNvPr id="2" name="タイトル 1"/>
+          <p:cNvSpPr>
+            <a:spLocks noGrp="1"/>
+          </p:cNvSpPr>
+          <p:nvPr>
+            <p:ph type="title"/>
+          </p:nvPr>
+        </p:nvSpPr>
+        <p:spPr/>
+        <p:txBody>
+          <a:bodyPr/>
+          <a:lstStyle/>
+          <a:p>
+            <a:r>
+              <a:rPr kumimoji="1" lang="ja-JP" altLang="en-US" dirty="0" smtClean="0"/>
+              <a:t>必要なのは師弟関係ではなく対等な関係</a:t>
+            </a:r>
+            <a:endParaRPr kumimoji="1" lang="ja-JP" altLang="en-US" dirty="0"/>
+          </a:p>
+        </p:txBody>
+      </p:sp>
+      <p:sp>
+        <p:nvSpPr>
+          <p:cNvPr id="3" name="コンテンツ プレースホルダー 2"/>
+          <p:cNvSpPr>
+            <a:spLocks noGrp="1"/>
+          </p:cNvSpPr>
+          <p:nvPr>
+            <p:ph idx="1"/>
+          </p:nvPr>
+        </p:nvSpPr>
+        <p:spPr/>
+        <p:txBody>
+          <a:bodyPr/>
+          <a:lstStyle/>
+          <a:p>
+            <a:r>
+              <a:rPr kumimoji="1" lang="ja-JP" altLang="en-US" dirty="0" smtClean="0"/>
+              <a:t>日々進歩する技術を習得するのに、年齢や経験は無関係です。</a:t>
+            </a:r>
+            <a:endParaRPr kumimoji="1" lang="en-US" altLang="ja-JP" dirty="0" smtClean="0"/>
+          </a:p>
+          <a:p>
+            <a:r>
+              <a:rPr lang="ja-JP" altLang="en-US" dirty="0" smtClean="0"/>
+              <a:t>若者も老人も、同じスタートラインに立っていると考えましょう。</a:t>
+            </a:r>
+            <a:endParaRPr lang="en-US" altLang="ja-JP" dirty="0" smtClean="0"/>
+          </a:p>
+          <a:p>
+            <a:pPr lvl="1"/>
+            <a:r>
+              <a:rPr lang="ja-JP" altLang="en-US" dirty="0" smtClean="0"/>
+              <a:t>同時に学ぶと、若者と同じ速さで学ぶことの難しさに気づくでしょう。</a:t>
+            </a:r>
+            <a:endParaRPr lang="en-US" altLang="ja-JP" dirty="0" smtClean="0"/>
+          </a:p>
+          <a:p>
+            <a:r>
+              <a:rPr lang="ja-JP" altLang="en-US" dirty="0" smtClean="0"/>
+              <a:t>経験の浅いエンジニアに対しても、その人なりの努力や知識をリスペクトしましょう。</a:t>
+            </a:r>
+            <a:endParaRPr lang="en-US" altLang="ja-JP" dirty="0" smtClean="0"/>
+          </a:p>
+          <a:p>
+            <a:r>
+              <a:rPr kumimoji="1" lang="ja-JP" altLang="en-US" dirty="0" smtClean="0"/>
+              <a:t>上司と部下という立場は、責任や給料の違いであり、エンジニアとしては対等であると心がけたいです。</a:t>
+            </a:r>
+            <a:endParaRPr kumimoji="1" lang="en-US" altLang="ja-JP" dirty="0" smtClean="0"/>
+          </a:p>
+          <a:p>
+            <a:endParaRPr kumimoji="1" lang="ja-JP" altLang="en-US" dirty="0"/>
+          </a:p>
+        </p:txBody>
+      </p:sp>
+    </p:spTree>
+    <p:extLst>
+      <p:ext uri="{BB962C8B-B14F-4D97-AF65-F5344CB8AC3E}">
+        <p14:creationId xmlns:p14="http://schemas.microsoft.com/office/powerpoint/2010/main" val="374441565"/>
       </p:ext>
     </p:extLst>
   </p:cSld>

</xml_diff>